<commit_message>
Analise Preliminar dos Pontos de Função do Projeto
Arquivo atualizado adicionado
</commit_message>
<xml_diff>
--- a/Trab Eng Software/3°Fase do trabalho/Apresentação Etapa 3 - Adaptação JP.pptx
+++ b/Trab Eng Software/3°Fase do trabalho/Apresentação Etapa 3 - Adaptação JP.pptx
@@ -10,12 +10,11 @@
     <p:sldId id="257" r:id="rId4"/>
     <p:sldId id="263" r:id="rId5"/>
     <p:sldId id="258" r:id="rId6"/>
-    <p:sldId id="266" r:id="rId7"/>
-    <p:sldId id="267" r:id="rId8"/>
-    <p:sldId id="260" r:id="rId9"/>
-    <p:sldId id="261" r:id="rId10"/>
-    <p:sldId id="262" r:id="rId11"/>
-    <p:sldId id="264" r:id="rId12"/>
+    <p:sldId id="267" r:id="rId7"/>
+    <p:sldId id="260" r:id="rId8"/>
+    <p:sldId id="261" r:id="rId9"/>
+    <p:sldId id="262" r:id="rId10"/>
+    <p:sldId id="264" r:id="rId11"/>
   </p:sldIdLst>
   <p:sldSz cx="9144000" cy="6858000" type="screen4x3"/>
   <p:notesSz cx="6858000" cy="9144000"/>
@@ -342,7 +341,7 @@
             <a:fld id="{50F12476-40B0-4B55-94BB-181E9532FFF8}" type="slidenum">
               <a:rPr lang="pt-BR" smtClean="0"/>
               <a:pPr/>
-              <a:t>‹#›</a:t>
+              <a:t>‹nº›</a:t>
             </a:fld>
             <a:endParaRPr lang="pt-BR"/>
           </a:p>
@@ -351,7 +350,7 @@
     </p:spTree>
     <p:extLst>
       <p:ext uri="{BB962C8B-B14F-4D97-AF65-F5344CB8AC3E}">
-        <p14:creationId xmlns="" xmlns:p14="http://schemas.microsoft.com/office/powerpoint/2010/main" val="1478311544"/>
+        <p14:creationId xmlns:p14="http://schemas.microsoft.com/office/powerpoint/2010/main" val="1478311544"/>
       </p:ext>
     </p:extLst>
   </p:cSld>
@@ -514,7 +513,7 @@
             <a:fld id="{50F12476-40B0-4B55-94BB-181E9532FFF8}" type="slidenum">
               <a:rPr lang="pt-BR" smtClean="0"/>
               <a:pPr/>
-              <a:t>‹#›</a:t>
+              <a:t>‹nº›</a:t>
             </a:fld>
             <a:endParaRPr lang="pt-BR"/>
           </a:p>
@@ -523,7 +522,7 @@
     </p:spTree>
     <p:extLst>
       <p:ext uri="{BB962C8B-B14F-4D97-AF65-F5344CB8AC3E}">
-        <p14:creationId xmlns="" xmlns:p14="http://schemas.microsoft.com/office/powerpoint/2010/main" val="3505800740"/>
+        <p14:creationId xmlns:p14="http://schemas.microsoft.com/office/powerpoint/2010/main" val="3505800740"/>
       </p:ext>
     </p:extLst>
   </p:cSld>
@@ -696,7 +695,7 @@
             <a:fld id="{50F12476-40B0-4B55-94BB-181E9532FFF8}" type="slidenum">
               <a:rPr lang="pt-BR" smtClean="0"/>
               <a:pPr/>
-              <a:t>‹#›</a:t>
+              <a:t>‹nº›</a:t>
             </a:fld>
             <a:endParaRPr lang="pt-BR"/>
           </a:p>
@@ -705,7 +704,7 @@
     </p:spTree>
     <p:extLst>
       <p:ext uri="{BB962C8B-B14F-4D97-AF65-F5344CB8AC3E}">
-        <p14:creationId xmlns="" xmlns:p14="http://schemas.microsoft.com/office/powerpoint/2010/main" val="2376402701"/>
+        <p14:creationId xmlns:p14="http://schemas.microsoft.com/office/powerpoint/2010/main" val="2376402701"/>
       </p:ext>
     </p:extLst>
   </p:cSld>
@@ -868,7 +867,7 @@
             <a:fld id="{50F12476-40B0-4B55-94BB-181E9532FFF8}" type="slidenum">
               <a:rPr lang="pt-BR" smtClean="0"/>
               <a:pPr/>
-              <a:t>‹#›</a:t>
+              <a:t>‹nº›</a:t>
             </a:fld>
             <a:endParaRPr lang="pt-BR"/>
           </a:p>
@@ -877,7 +876,7 @@
     </p:spTree>
     <p:extLst>
       <p:ext uri="{BB962C8B-B14F-4D97-AF65-F5344CB8AC3E}">
-        <p14:creationId xmlns="" xmlns:p14="http://schemas.microsoft.com/office/powerpoint/2010/main" val="3172837465"/>
+        <p14:creationId xmlns:p14="http://schemas.microsoft.com/office/powerpoint/2010/main" val="3172837465"/>
       </p:ext>
     </p:extLst>
   </p:cSld>
@@ -1116,7 +1115,7 @@
             <a:fld id="{50F12476-40B0-4B55-94BB-181E9532FFF8}" type="slidenum">
               <a:rPr lang="pt-BR" smtClean="0"/>
               <a:pPr/>
-              <a:t>‹#›</a:t>
+              <a:t>‹nº›</a:t>
             </a:fld>
             <a:endParaRPr lang="pt-BR"/>
           </a:p>
@@ -1125,7 +1124,7 @@
     </p:spTree>
     <p:extLst>
       <p:ext uri="{BB962C8B-B14F-4D97-AF65-F5344CB8AC3E}">
-        <p14:creationId xmlns="" xmlns:p14="http://schemas.microsoft.com/office/powerpoint/2010/main" val="2539215369"/>
+        <p14:creationId xmlns:p14="http://schemas.microsoft.com/office/powerpoint/2010/main" val="2539215369"/>
       </p:ext>
     </p:extLst>
   </p:cSld>
@@ -1406,7 +1405,7 @@
             <a:fld id="{50F12476-40B0-4B55-94BB-181E9532FFF8}" type="slidenum">
               <a:rPr lang="pt-BR" smtClean="0"/>
               <a:pPr/>
-              <a:t>‹#›</a:t>
+              <a:t>‹nº›</a:t>
             </a:fld>
             <a:endParaRPr lang="pt-BR"/>
           </a:p>
@@ -1415,7 +1414,7 @@
     </p:spTree>
     <p:extLst>
       <p:ext uri="{BB962C8B-B14F-4D97-AF65-F5344CB8AC3E}">
-        <p14:creationId xmlns="" xmlns:p14="http://schemas.microsoft.com/office/powerpoint/2010/main" val="1331431120"/>
+        <p14:creationId xmlns:p14="http://schemas.microsoft.com/office/powerpoint/2010/main" val="1331431120"/>
       </p:ext>
     </p:extLst>
   </p:cSld>
@@ -1830,7 +1829,7 @@
             <a:fld id="{50F12476-40B0-4B55-94BB-181E9532FFF8}" type="slidenum">
               <a:rPr lang="pt-BR" smtClean="0"/>
               <a:pPr/>
-              <a:t>‹#›</a:t>
+              <a:t>‹nº›</a:t>
             </a:fld>
             <a:endParaRPr lang="pt-BR"/>
           </a:p>
@@ -1839,7 +1838,7 @@
     </p:spTree>
     <p:extLst>
       <p:ext uri="{BB962C8B-B14F-4D97-AF65-F5344CB8AC3E}">
-        <p14:creationId xmlns="" xmlns:p14="http://schemas.microsoft.com/office/powerpoint/2010/main" val="1217087604"/>
+        <p14:creationId xmlns:p14="http://schemas.microsoft.com/office/powerpoint/2010/main" val="1217087604"/>
       </p:ext>
     </p:extLst>
   </p:cSld>
@@ -1950,7 +1949,7 @@
             <a:fld id="{50F12476-40B0-4B55-94BB-181E9532FFF8}" type="slidenum">
               <a:rPr lang="pt-BR" smtClean="0"/>
               <a:pPr/>
-              <a:t>‹#›</a:t>
+              <a:t>‹nº›</a:t>
             </a:fld>
             <a:endParaRPr lang="pt-BR"/>
           </a:p>
@@ -1959,7 +1958,7 @@
     </p:spTree>
     <p:extLst>
       <p:ext uri="{BB962C8B-B14F-4D97-AF65-F5344CB8AC3E}">
-        <p14:creationId xmlns="" xmlns:p14="http://schemas.microsoft.com/office/powerpoint/2010/main" val="1097157162"/>
+        <p14:creationId xmlns:p14="http://schemas.microsoft.com/office/powerpoint/2010/main" val="1097157162"/>
       </p:ext>
     </p:extLst>
   </p:cSld>
@@ -2047,7 +2046,7 @@
             <a:fld id="{50F12476-40B0-4B55-94BB-181E9532FFF8}" type="slidenum">
               <a:rPr lang="pt-BR" smtClean="0"/>
               <a:pPr/>
-              <a:t>‹#›</a:t>
+              <a:t>‹nº›</a:t>
             </a:fld>
             <a:endParaRPr lang="pt-BR"/>
           </a:p>
@@ -2056,7 +2055,7 @@
     </p:spTree>
     <p:extLst>
       <p:ext uri="{BB962C8B-B14F-4D97-AF65-F5344CB8AC3E}">
-        <p14:creationId xmlns="" xmlns:p14="http://schemas.microsoft.com/office/powerpoint/2010/main" val="1679169195"/>
+        <p14:creationId xmlns:p14="http://schemas.microsoft.com/office/powerpoint/2010/main" val="1679169195"/>
       </p:ext>
     </p:extLst>
   </p:cSld>
@@ -2326,7 +2325,7 @@
             <a:fld id="{50F12476-40B0-4B55-94BB-181E9532FFF8}" type="slidenum">
               <a:rPr lang="pt-BR" smtClean="0"/>
               <a:pPr/>
-              <a:t>‹#›</a:t>
+              <a:t>‹nº›</a:t>
             </a:fld>
             <a:endParaRPr lang="pt-BR"/>
           </a:p>
@@ -2335,7 +2334,7 @@
     </p:spTree>
     <p:extLst>
       <p:ext uri="{BB962C8B-B14F-4D97-AF65-F5344CB8AC3E}">
-        <p14:creationId xmlns="" xmlns:p14="http://schemas.microsoft.com/office/powerpoint/2010/main" val="526725474"/>
+        <p14:creationId xmlns:p14="http://schemas.microsoft.com/office/powerpoint/2010/main" val="526725474"/>
       </p:ext>
     </p:extLst>
   </p:cSld>
@@ -2581,7 +2580,7 @@
             <a:fld id="{50F12476-40B0-4B55-94BB-181E9532FFF8}" type="slidenum">
               <a:rPr lang="pt-BR" smtClean="0"/>
               <a:pPr/>
-              <a:t>‹#›</a:t>
+              <a:t>‹nº›</a:t>
             </a:fld>
             <a:endParaRPr lang="pt-BR"/>
           </a:p>
@@ -2590,7 +2589,7 @@
     </p:spTree>
     <p:extLst>
       <p:ext uri="{BB962C8B-B14F-4D97-AF65-F5344CB8AC3E}">
-        <p14:creationId xmlns="" xmlns:p14="http://schemas.microsoft.com/office/powerpoint/2010/main" val="620370457"/>
+        <p14:creationId xmlns:p14="http://schemas.microsoft.com/office/powerpoint/2010/main" val="620370457"/>
       </p:ext>
     </p:extLst>
   </p:cSld>
@@ -2837,7 +2836,7 @@
             <a:fld id="{50F12476-40B0-4B55-94BB-181E9532FFF8}" type="slidenum">
               <a:rPr lang="pt-BR" smtClean="0"/>
               <a:pPr/>
-              <a:t>‹#›</a:t>
+              <a:t>‹nº›</a:t>
             </a:fld>
             <a:endParaRPr lang="pt-BR"/>
           </a:p>
@@ -2846,7 +2845,7 @@
     </p:spTree>
     <p:extLst>
       <p:ext uri="{BB962C8B-B14F-4D97-AF65-F5344CB8AC3E}">
-        <p14:creationId xmlns="" xmlns:p14="http://schemas.microsoft.com/office/powerpoint/2010/main" val="1535434443"/>
+        <p14:creationId xmlns:p14="http://schemas.microsoft.com/office/powerpoint/2010/main" val="1535434443"/>
       </p:ext>
     </p:extLst>
   </p:cSld>
@@ -3180,7 +3179,7 @@
           <a:blip r:embed="rId2" cstate="print">
             <a:extLst>
               <a:ext uri="{28A0092B-C50C-407E-A947-70E740481C1C}">
-                <a14:useLocalDpi xmlns="" xmlns:a14="http://schemas.microsoft.com/office/drawing/2010/main" val="0"/>
+                <a14:useLocalDpi xmlns:a14="http://schemas.microsoft.com/office/drawing/2010/main" val="0"/>
               </a:ext>
             </a:extLst>
           </a:blip>
@@ -3200,7 +3199,7 @@
           <a:noFill/>
           <a:extLst>
             <a:ext uri="{909E8E84-426E-40DD-AFC4-6F175D3DCCD1}">
-              <a14:hiddenFill xmlns="" xmlns:a14="http://schemas.microsoft.com/office/drawing/2010/main">
+              <a14:hiddenFill xmlns:a14="http://schemas.microsoft.com/office/drawing/2010/main">
                 <a:solidFill>
                   <a:srgbClr val="FFFFFF"/>
                 </a:solidFill>
@@ -3212,7 +3211,7 @@
     </p:spTree>
     <p:extLst>
       <p:ext uri="{BB962C8B-B14F-4D97-AF65-F5344CB8AC3E}">
-        <p14:creationId xmlns="" xmlns:p14="http://schemas.microsoft.com/office/powerpoint/2010/main" val="1378676636"/>
+        <p14:creationId xmlns:p14="http://schemas.microsoft.com/office/powerpoint/2010/main" val="1378676636"/>
       </p:ext>
     </p:extLst>
   </p:cSld>
@@ -3299,896 +3298,6 @@
 </file>
 
 <file path=ppt/slides/slide10.xml><?xml version="1.0" encoding="utf-8"?>
-<p:sld xmlns:a="http://schemas.openxmlformats.org/drawingml/2006/main" xmlns:r="http://schemas.openxmlformats.org/officeDocument/2006/relationships" xmlns:p="http://schemas.openxmlformats.org/presentationml/2006/main">
-  <p:cSld>
-    <p:spTree>
-      <p:nvGrpSpPr>
-        <p:cNvPr id="1" name=""/>
-        <p:cNvGrpSpPr/>
-        <p:nvPr/>
-      </p:nvGrpSpPr>
-      <p:grpSpPr>
-        <a:xfrm>
-          <a:off x="0" y="0"/>
-          <a:ext cx="0" cy="0"/>
-          <a:chOff x="0" y="0"/>
-          <a:chExt cx="0" cy="0"/>
-        </a:xfrm>
-      </p:grpSpPr>
-      <p:graphicFrame>
-        <p:nvGraphicFramePr>
-          <p:cNvPr id="2" name="Tabela 1"/>
-          <p:cNvGraphicFramePr>
-            <a:graphicFrameLocks noGrp="1"/>
-          </p:cNvGraphicFramePr>
-          <p:nvPr>
-            <p:extLst>
-              <p:ext uri="{D42A27DB-BD31-4B8C-83A1-F6EECF244321}">
-                <p14:modId xmlns="" xmlns:p14="http://schemas.microsoft.com/office/powerpoint/2010/main" val="4053274123"/>
-              </p:ext>
-            </p:extLst>
-          </p:nvPr>
-        </p:nvGraphicFramePr>
-        <p:xfrm>
-          <a:off x="251520" y="1196752"/>
-          <a:ext cx="8712968" cy="4588248"/>
-        </p:xfrm>
-        <a:graphic>
-          <a:graphicData uri="http://schemas.openxmlformats.org/drawingml/2006/table">
-            <a:tbl>
-              <a:tblPr/>
-              <a:tblGrid>
-                <a:gridCol w="6470534"/>
-                <a:gridCol w="2242434"/>
-              </a:tblGrid>
-              <a:tr h="477053">
-                <a:tc>
-                  <a:txBody>
-                    <a:bodyPr/>
-                    <a:lstStyle/>
-                    <a:p>
-                      <a:pPr algn="l" fontAlgn="b"/>
-                      <a:r>
-                        <a:rPr lang="pt-BR" sz="2800" b="0" i="0" u="none" strike="noStrike">
-                          <a:effectLst/>
-                          <a:latin typeface="Arial"/>
-                        </a:rPr>
-                        <a:t>4ª Semana</a:t>
-                      </a:r>
-                    </a:p>
-                  </a:txBody>
-                  <a:tcPr marL="9525" marR="9525" marT="9525" marB="0" anchor="b">
-                    <a:lnL w="6350" cap="flat" cmpd="sng" algn="ctr">
-                      <a:solidFill>
-                        <a:srgbClr val="000000"/>
-                      </a:solidFill>
-                      <a:prstDash val="dot"/>
-                      <a:round/>
-                      <a:headEnd type="none" w="med" len="med"/>
-                      <a:tailEnd type="none" w="med" len="med"/>
-                    </a:lnL>
-                    <a:lnR w="6350" cap="flat" cmpd="sng" algn="ctr">
-                      <a:solidFill>
-                        <a:srgbClr val="000000"/>
-                      </a:solidFill>
-                      <a:prstDash val="dot"/>
-                      <a:round/>
-                      <a:headEnd type="none" w="med" len="med"/>
-                      <a:tailEnd type="none" w="med" len="med"/>
-                    </a:lnR>
-                    <a:lnT w="6350" cap="flat" cmpd="sng" algn="ctr">
-                      <a:solidFill>
-                        <a:srgbClr val="000000"/>
-                      </a:solidFill>
-                      <a:prstDash val="dot"/>
-                      <a:round/>
-                      <a:headEnd type="none" w="med" len="med"/>
-                      <a:tailEnd type="none" w="med" len="med"/>
-                    </a:lnT>
-                    <a:lnB w="6350" cap="flat" cmpd="sng" algn="ctr">
-                      <a:solidFill>
-                        <a:srgbClr val="000000"/>
-                      </a:solidFill>
-                      <a:prstDash val="dot"/>
-                      <a:round/>
-                      <a:headEnd type="none" w="med" len="med"/>
-                      <a:tailEnd type="none" w="med" len="med"/>
-                    </a:lnB>
-                  </a:tcPr>
-                </a:tc>
-                <a:tc>
-                  <a:txBody>
-                    <a:bodyPr/>
-                    <a:lstStyle/>
-                    <a:p>
-                      <a:pPr algn="l" fontAlgn="b"/>
-                      <a:r>
-                        <a:rPr lang="pt-BR" sz="2800" b="0" i="0" u="none" strike="noStrike">
-                          <a:effectLst/>
-                          <a:latin typeface="Arial"/>
-                        </a:rPr>
-                        <a:t>Gerou</a:t>
-                      </a:r>
-                    </a:p>
-                  </a:txBody>
-                  <a:tcPr marL="9525" marR="9525" marT="9525" marB="0" anchor="b">
-                    <a:lnL w="6350" cap="flat" cmpd="sng" algn="ctr">
-                      <a:solidFill>
-                        <a:srgbClr val="000000"/>
-                      </a:solidFill>
-                      <a:prstDash val="dot"/>
-                      <a:round/>
-                      <a:headEnd type="none" w="med" len="med"/>
-                      <a:tailEnd type="none" w="med" len="med"/>
-                    </a:lnL>
-                    <a:lnR w="6350" cap="flat" cmpd="sng" algn="ctr">
-                      <a:solidFill>
-                        <a:srgbClr val="000000"/>
-                      </a:solidFill>
-                      <a:prstDash val="dot"/>
-                      <a:round/>
-                      <a:headEnd type="none" w="med" len="med"/>
-                      <a:tailEnd type="none" w="med" len="med"/>
-                    </a:lnR>
-                    <a:lnT w="6350" cap="flat" cmpd="sng" algn="ctr">
-                      <a:solidFill>
-                        <a:srgbClr val="000000"/>
-                      </a:solidFill>
-                      <a:prstDash val="dot"/>
-                      <a:round/>
-                      <a:headEnd type="none" w="med" len="med"/>
-                      <a:tailEnd type="none" w="med" len="med"/>
-                    </a:lnT>
-                    <a:lnB w="6350" cap="flat" cmpd="sng" algn="ctr">
-                      <a:solidFill>
-                        <a:srgbClr val="000000"/>
-                      </a:solidFill>
-                      <a:prstDash val="dot"/>
-                      <a:round/>
-                      <a:headEnd type="none" w="med" len="med"/>
-                      <a:tailEnd type="none" w="med" len="med"/>
-                    </a:lnB>
-                  </a:tcPr>
-                </a:tc>
-              </a:tr>
-              <a:tr h="477053">
-                <a:tc>
-                  <a:txBody>
-                    <a:bodyPr/>
-                    <a:lstStyle/>
-                    <a:p>
-                      <a:pPr algn="l" fontAlgn="b"/>
-                      <a:r>
-                        <a:rPr lang="pt-BR" sz="2800" b="0" i="0" u="none" strike="noStrike">
-                          <a:effectLst/>
-                          <a:latin typeface="Arial"/>
-                        </a:rPr>
-                        <a:t>Elaboração do banco de dados, dos módulos de cadastro</a:t>
-                      </a:r>
-                    </a:p>
-                  </a:txBody>
-                  <a:tcPr marL="9525" marR="9525" marT="9525" marB="0" anchor="b">
-                    <a:lnL w="6350" cap="flat" cmpd="sng" algn="ctr">
-                      <a:solidFill>
-                        <a:srgbClr val="000000"/>
-                      </a:solidFill>
-                      <a:prstDash val="dot"/>
-                      <a:round/>
-                      <a:headEnd type="none" w="med" len="med"/>
-                      <a:tailEnd type="none" w="med" len="med"/>
-                    </a:lnL>
-                    <a:lnR w="6350" cap="flat" cmpd="sng" algn="ctr">
-                      <a:solidFill>
-                        <a:srgbClr val="000000"/>
-                      </a:solidFill>
-                      <a:prstDash val="dot"/>
-                      <a:round/>
-                      <a:headEnd type="none" w="med" len="med"/>
-                      <a:tailEnd type="none" w="med" len="med"/>
-                    </a:lnR>
-                    <a:lnT w="6350" cap="flat" cmpd="sng" algn="ctr">
-                      <a:solidFill>
-                        <a:srgbClr val="000000"/>
-                      </a:solidFill>
-                      <a:prstDash val="dot"/>
-                      <a:round/>
-                      <a:headEnd type="none" w="med" len="med"/>
-                      <a:tailEnd type="none" w="med" len="med"/>
-                    </a:lnT>
-                    <a:lnB w="6350" cap="flat" cmpd="sng" algn="ctr">
-                      <a:solidFill>
-                        <a:srgbClr val="000000"/>
-                      </a:solidFill>
-                      <a:prstDash val="dot"/>
-                      <a:round/>
-                      <a:headEnd type="none" w="med" len="med"/>
-                      <a:tailEnd type="none" w="med" len="med"/>
-                    </a:lnB>
-                  </a:tcPr>
-                </a:tc>
-                <a:tc>
-                  <a:txBody>
-                    <a:bodyPr/>
-                    <a:lstStyle/>
-                    <a:p>
-                      <a:pPr algn="l" fontAlgn="b"/>
-                      <a:r>
-                        <a:rPr lang="pt-BR" sz="2800" b="0" i="0" u="none" strike="noStrike">
-                          <a:effectLst/>
-                          <a:latin typeface="Arial"/>
-                        </a:rPr>
-                        <a:t>banco de dados</a:t>
-                      </a:r>
-                    </a:p>
-                  </a:txBody>
-                  <a:tcPr marL="9525" marR="9525" marT="9525" marB="0" anchor="b">
-                    <a:lnL w="6350" cap="flat" cmpd="sng" algn="ctr">
-                      <a:solidFill>
-                        <a:srgbClr val="000000"/>
-                      </a:solidFill>
-                      <a:prstDash val="dot"/>
-                      <a:round/>
-                      <a:headEnd type="none" w="med" len="med"/>
-                      <a:tailEnd type="none" w="med" len="med"/>
-                    </a:lnL>
-                    <a:lnR w="6350" cap="flat" cmpd="sng" algn="ctr">
-                      <a:solidFill>
-                        <a:srgbClr val="000000"/>
-                      </a:solidFill>
-                      <a:prstDash val="dot"/>
-                      <a:round/>
-                      <a:headEnd type="none" w="med" len="med"/>
-                      <a:tailEnd type="none" w="med" len="med"/>
-                    </a:lnR>
-                    <a:lnT w="6350" cap="flat" cmpd="sng" algn="ctr">
-                      <a:solidFill>
-                        <a:srgbClr val="000000"/>
-                      </a:solidFill>
-                      <a:prstDash val="dot"/>
-                      <a:round/>
-                      <a:headEnd type="none" w="med" len="med"/>
-                      <a:tailEnd type="none" w="med" len="med"/>
-                    </a:lnT>
-                    <a:lnB w="6350" cap="flat" cmpd="sng" algn="ctr">
-                      <a:solidFill>
-                        <a:srgbClr val="000000"/>
-                      </a:solidFill>
-                      <a:prstDash val="dot"/>
-                      <a:round/>
-                      <a:headEnd type="none" w="med" len="med"/>
-                      <a:tailEnd type="none" w="med" len="med"/>
-                    </a:lnB>
-                  </a:tcPr>
-                </a:tc>
-              </a:tr>
-              <a:tr h="477053">
-                <a:tc>
-                  <a:txBody>
-                    <a:bodyPr/>
-                    <a:lstStyle/>
-                    <a:p>
-                      <a:pPr algn="l" fontAlgn="b"/>
-                      <a:endParaRPr lang="pt-BR" sz="2800" b="0" i="0" u="none" strike="noStrike">
-                        <a:effectLst/>
-                        <a:latin typeface="Arial"/>
-                      </a:endParaRPr>
-                    </a:p>
-                  </a:txBody>
-                  <a:tcPr marL="9525" marR="9525" marT="9525" marB="0" anchor="b">
-                    <a:lnL>
-                      <a:noFill/>
-                    </a:lnL>
-                    <a:lnR>
-                      <a:noFill/>
-                    </a:lnR>
-                    <a:lnT w="6350" cap="flat" cmpd="sng" algn="ctr">
-                      <a:solidFill>
-                        <a:srgbClr val="000000"/>
-                      </a:solidFill>
-                      <a:prstDash val="dot"/>
-                      <a:round/>
-                      <a:headEnd type="none" w="med" len="med"/>
-                      <a:tailEnd type="none" w="med" len="med"/>
-                    </a:lnT>
-                    <a:lnB w="6350" cap="flat" cmpd="sng" algn="ctr">
-                      <a:solidFill>
-                        <a:srgbClr val="000000"/>
-                      </a:solidFill>
-                      <a:prstDash val="dot"/>
-                      <a:round/>
-                      <a:headEnd type="none" w="med" len="med"/>
-                      <a:tailEnd type="none" w="med" len="med"/>
-                    </a:lnB>
-                  </a:tcPr>
-                </a:tc>
-                <a:tc>
-                  <a:txBody>
-                    <a:bodyPr/>
-                    <a:lstStyle/>
-                    <a:p>
-                      <a:pPr algn="l" fontAlgn="b"/>
-                      <a:endParaRPr lang="pt-BR" sz="2800" b="0" i="0" u="none" strike="noStrike">
-                        <a:effectLst/>
-                        <a:latin typeface="Arial"/>
-                      </a:endParaRPr>
-                    </a:p>
-                  </a:txBody>
-                  <a:tcPr marL="9525" marR="9525" marT="9525" marB="0" anchor="b">
-                    <a:lnL>
-                      <a:noFill/>
-                    </a:lnL>
-                    <a:lnR>
-                      <a:noFill/>
-                    </a:lnR>
-                    <a:lnT w="6350" cap="flat" cmpd="sng" algn="ctr">
-                      <a:solidFill>
-                        <a:srgbClr val="000000"/>
-                      </a:solidFill>
-                      <a:prstDash val="dot"/>
-                      <a:round/>
-                      <a:headEnd type="none" w="med" len="med"/>
-                      <a:tailEnd type="none" w="med" len="med"/>
-                    </a:lnT>
-                    <a:lnB w="6350" cap="flat" cmpd="sng" algn="ctr">
-                      <a:solidFill>
-                        <a:srgbClr val="000000"/>
-                      </a:solidFill>
-                      <a:prstDash val="dot"/>
-                      <a:round/>
-                      <a:headEnd type="none" w="med" len="med"/>
-                      <a:tailEnd type="none" w="med" len="med"/>
-                    </a:lnB>
-                  </a:tcPr>
-                </a:tc>
-              </a:tr>
-              <a:tr h="477053">
-                <a:tc>
-                  <a:txBody>
-                    <a:bodyPr/>
-                    <a:lstStyle/>
-                    <a:p>
-                      <a:pPr algn="l" fontAlgn="b"/>
-                      <a:r>
-                        <a:rPr lang="pt-BR" sz="2800" b="0" i="0" u="none" strike="noStrike">
-                          <a:effectLst/>
-                          <a:latin typeface="Arial"/>
-                        </a:rPr>
-                        <a:t>5ª semana</a:t>
-                      </a:r>
-                    </a:p>
-                  </a:txBody>
-                  <a:tcPr marL="9525" marR="9525" marT="9525" marB="0" anchor="b">
-                    <a:lnL w="6350" cap="flat" cmpd="sng" algn="ctr">
-                      <a:solidFill>
-                        <a:srgbClr val="000000"/>
-                      </a:solidFill>
-                      <a:prstDash val="dot"/>
-                      <a:round/>
-                      <a:headEnd type="none" w="med" len="med"/>
-                      <a:tailEnd type="none" w="med" len="med"/>
-                    </a:lnL>
-                    <a:lnR w="6350" cap="flat" cmpd="sng" algn="ctr">
-                      <a:solidFill>
-                        <a:srgbClr val="000000"/>
-                      </a:solidFill>
-                      <a:prstDash val="dot"/>
-                      <a:round/>
-                      <a:headEnd type="none" w="med" len="med"/>
-                      <a:tailEnd type="none" w="med" len="med"/>
-                    </a:lnR>
-                    <a:lnT w="6350" cap="flat" cmpd="sng" algn="ctr">
-                      <a:solidFill>
-                        <a:srgbClr val="000000"/>
-                      </a:solidFill>
-                      <a:prstDash val="dot"/>
-                      <a:round/>
-                      <a:headEnd type="none" w="med" len="med"/>
-                      <a:tailEnd type="none" w="med" len="med"/>
-                    </a:lnT>
-                    <a:lnB w="6350" cap="flat" cmpd="sng" algn="ctr">
-                      <a:solidFill>
-                        <a:srgbClr val="000000"/>
-                      </a:solidFill>
-                      <a:prstDash val="dot"/>
-                      <a:round/>
-                      <a:headEnd type="none" w="med" len="med"/>
-                      <a:tailEnd type="none" w="med" len="med"/>
-                    </a:lnB>
-                  </a:tcPr>
-                </a:tc>
-                <a:tc>
-                  <a:txBody>
-                    <a:bodyPr/>
-                    <a:lstStyle/>
-                    <a:p>
-                      <a:pPr algn="l" fontAlgn="b"/>
-                      <a:r>
-                        <a:rPr lang="pt-BR" sz="2800" b="0" i="0" u="none" strike="noStrike">
-                          <a:effectLst/>
-                          <a:latin typeface="Arial"/>
-                        </a:rPr>
-                        <a:t>Gerou</a:t>
-                      </a:r>
-                    </a:p>
-                  </a:txBody>
-                  <a:tcPr marL="9525" marR="9525" marT="9525" marB="0" anchor="b">
-                    <a:lnL w="6350" cap="flat" cmpd="sng" algn="ctr">
-                      <a:solidFill>
-                        <a:srgbClr val="000000"/>
-                      </a:solidFill>
-                      <a:prstDash val="dot"/>
-                      <a:round/>
-                      <a:headEnd type="none" w="med" len="med"/>
-                      <a:tailEnd type="none" w="med" len="med"/>
-                    </a:lnL>
-                    <a:lnR w="6350" cap="flat" cmpd="sng" algn="ctr">
-                      <a:solidFill>
-                        <a:srgbClr val="000000"/>
-                      </a:solidFill>
-                      <a:prstDash val="dot"/>
-                      <a:round/>
-                      <a:headEnd type="none" w="med" len="med"/>
-                      <a:tailEnd type="none" w="med" len="med"/>
-                    </a:lnR>
-                    <a:lnT w="6350" cap="flat" cmpd="sng" algn="ctr">
-                      <a:solidFill>
-                        <a:srgbClr val="000000"/>
-                      </a:solidFill>
-                      <a:prstDash val="dot"/>
-                      <a:round/>
-                      <a:headEnd type="none" w="med" len="med"/>
-                      <a:tailEnd type="none" w="med" len="med"/>
-                    </a:lnT>
-                    <a:lnB w="6350" cap="flat" cmpd="sng" algn="ctr">
-                      <a:solidFill>
-                        <a:srgbClr val="000000"/>
-                      </a:solidFill>
-                      <a:prstDash val="dot"/>
-                      <a:round/>
-                      <a:headEnd type="none" w="med" len="med"/>
-                      <a:tailEnd type="none" w="med" len="med"/>
-                    </a:lnB>
-                  </a:tcPr>
-                </a:tc>
-              </a:tr>
-              <a:tr h="477053">
-                <a:tc>
-                  <a:txBody>
-                    <a:bodyPr/>
-                    <a:lstStyle/>
-                    <a:p>
-                      <a:pPr algn="l" fontAlgn="b"/>
-                      <a:r>
-                        <a:rPr lang="pt-BR" sz="2800" b="0" i="0" u="none" strike="noStrike">
-                          <a:effectLst/>
-                          <a:latin typeface="Arial"/>
-                        </a:rPr>
-                        <a:t>Elaboração da interface gráfica e testes.</a:t>
-                      </a:r>
-                    </a:p>
-                  </a:txBody>
-                  <a:tcPr marL="9525" marR="9525" marT="9525" marB="0" anchor="b">
-                    <a:lnL w="6350" cap="flat" cmpd="sng" algn="ctr">
-                      <a:solidFill>
-                        <a:srgbClr val="000000"/>
-                      </a:solidFill>
-                      <a:prstDash val="dot"/>
-                      <a:round/>
-                      <a:headEnd type="none" w="med" len="med"/>
-                      <a:tailEnd type="none" w="med" len="med"/>
-                    </a:lnL>
-                    <a:lnR w="6350" cap="flat" cmpd="sng" algn="ctr">
-                      <a:solidFill>
-                        <a:srgbClr val="000000"/>
-                      </a:solidFill>
-                      <a:prstDash val="dot"/>
-                      <a:round/>
-                      <a:headEnd type="none" w="med" len="med"/>
-                      <a:tailEnd type="none" w="med" len="med"/>
-                    </a:lnR>
-                    <a:lnT w="6350" cap="flat" cmpd="sng" algn="ctr">
-                      <a:solidFill>
-                        <a:srgbClr val="000000"/>
-                      </a:solidFill>
-                      <a:prstDash val="dot"/>
-                      <a:round/>
-                      <a:headEnd type="none" w="med" len="med"/>
-                      <a:tailEnd type="none" w="med" len="med"/>
-                    </a:lnT>
-                    <a:lnB w="6350" cap="flat" cmpd="sng" algn="ctr">
-                      <a:solidFill>
-                        <a:srgbClr val="000000"/>
-                      </a:solidFill>
-                      <a:prstDash val="dot"/>
-                      <a:round/>
-                      <a:headEnd type="none" w="med" len="med"/>
-                      <a:tailEnd type="none" w="med" len="med"/>
-                    </a:lnB>
-                  </a:tcPr>
-                </a:tc>
-                <a:tc>
-                  <a:txBody>
-                    <a:bodyPr/>
-                    <a:lstStyle/>
-                    <a:p>
-                      <a:pPr algn="l" fontAlgn="b"/>
-                      <a:r>
-                        <a:rPr lang="pt-BR" sz="2800" b="0" i="0" u="none" strike="noStrike">
-                          <a:effectLst/>
-                          <a:latin typeface="Arial"/>
-                        </a:rPr>
-                        <a:t>Interface</a:t>
-                      </a:r>
-                    </a:p>
-                  </a:txBody>
-                  <a:tcPr marL="9525" marR="9525" marT="9525" marB="0" anchor="b">
-                    <a:lnL w="6350" cap="flat" cmpd="sng" algn="ctr">
-                      <a:solidFill>
-                        <a:srgbClr val="000000"/>
-                      </a:solidFill>
-                      <a:prstDash val="dot"/>
-                      <a:round/>
-                      <a:headEnd type="none" w="med" len="med"/>
-                      <a:tailEnd type="none" w="med" len="med"/>
-                    </a:lnL>
-                    <a:lnR w="6350" cap="flat" cmpd="sng" algn="ctr">
-                      <a:solidFill>
-                        <a:srgbClr val="000000"/>
-                      </a:solidFill>
-                      <a:prstDash val="dot"/>
-                      <a:round/>
-                      <a:headEnd type="none" w="med" len="med"/>
-                      <a:tailEnd type="none" w="med" len="med"/>
-                    </a:lnR>
-                    <a:lnT w="6350" cap="flat" cmpd="sng" algn="ctr">
-                      <a:solidFill>
-                        <a:srgbClr val="000000"/>
-                      </a:solidFill>
-                      <a:prstDash val="dot"/>
-                      <a:round/>
-                      <a:headEnd type="none" w="med" len="med"/>
-                      <a:tailEnd type="none" w="med" len="med"/>
-                    </a:lnT>
-                    <a:lnB w="6350" cap="flat" cmpd="sng" algn="ctr">
-                      <a:solidFill>
-                        <a:srgbClr val="000000"/>
-                      </a:solidFill>
-                      <a:prstDash val="dot"/>
-                      <a:round/>
-                      <a:headEnd type="none" w="med" len="med"/>
-                      <a:tailEnd type="none" w="med" len="med"/>
-                    </a:lnB>
-                  </a:tcPr>
-                </a:tc>
-              </a:tr>
-              <a:tr h="477053">
-                <a:tc>
-                  <a:txBody>
-                    <a:bodyPr/>
-                    <a:lstStyle/>
-                    <a:p>
-                      <a:pPr algn="l" fontAlgn="b"/>
-                      <a:endParaRPr lang="pt-BR" sz="2800" b="0" i="0" u="none" strike="noStrike">
-                        <a:effectLst/>
-                        <a:latin typeface="Arial"/>
-                      </a:endParaRPr>
-                    </a:p>
-                  </a:txBody>
-                  <a:tcPr marL="9525" marR="9525" marT="9525" marB="0" anchor="b">
-                    <a:lnL>
-                      <a:noFill/>
-                    </a:lnL>
-                    <a:lnR>
-                      <a:noFill/>
-                    </a:lnR>
-                    <a:lnT w="6350" cap="flat" cmpd="sng" algn="ctr">
-                      <a:solidFill>
-                        <a:srgbClr val="000000"/>
-                      </a:solidFill>
-                      <a:prstDash val="dot"/>
-                      <a:round/>
-                      <a:headEnd type="none" w="med" len="med"/>
-                      <a:tailEnd type="none" w="med" len="med"/>
-                    </a:lnT>
-                    <a:lnB w="6350" cap="flat" cmpd="sng" algn="ctr">
-                      <a:solidFill>
-                        <a:srgbClr val="000000"/>
-                      </a:solidFill>
-                      <a:prstDash val="dot"/>
-                      <a:round/>
-                      <a:headEnd type="none" w="med" len="med"/>
-                      <a:tailEnd type="none" w="med" len="med"/>
-                    </a:lnB>
-                  </a:tcPr>
-                </a:tc>
-                <a:tc>
-                  <a:txBody>
-                    <a:bodyPr/>
-                    <a:lstStyle/>
-                    <a:p>
-                      <a:pPr algn="l" fontAlgn="b"/>
-                      <a:endParaRPr lang="pt-BR" sz="2800" b="0" i="0" u="none" strike="noStrike">
-                        <a:effectLst/>
-                        <a:latin typeface="Arial"/>
-                      </a:endParaRPr>
-                    </a:p>
-                  </a:txBody>
-                  <a:tcPr marL="9525" marR="9525" marT="9525" marB="0" anchor="b">
-                    <a:lnL>
-                      <a:noFill/>
-                    </a:lnL>
-                    <a:lnR>
-                      <a:noFill/>
-                    </a:lnR>
-                    <a:lnT w="6350" cap="flat" cmpd="sng" algn="ctr">
-                      <a:solidFill>
-                        <a:srgbClr val="000000"/>
-                      </a:solidFill>
-                      <a:prstDash val="dot"/>
-                      <a:round/>
-                      <a:headEnd type="none" w="med" len="med"/>
-                      <a:tailEnd type="none" w="med" len="med"/>
-                    </a:lnT>
-                    <a:lnB w="6350" cap="flat" cmpd="sng" algn="ctr">
-                      <a:solidFill>
-                        <a:srgbClr val="000000"/>
-                      </a:solidFill>
-                      <a:prstDash val="dot"/>
-                      <a:round/>
-                      <a:headEnd type="none" w="med" len="med"/>
-                      <a:tailEnd type="none" w="med" len="med"/>
-                    </a:lnB>
-                  </a:tcPr>
-                </a:tc>
-              </a:tr>
-              <a:tr h="477053">
-                <a:tc>
-                  <a:txBody>
-                    <a:bodyPr/>
-                    <a:lstStyle/>
-                    <a:p>
-                      <a:pPr algn="l" fontAlgn="b"/>
-                      <a:r>
-                        <a:rPr lang="pt-BR" sz="2800" b="0" i="0" u="none" strike="noStrike">
-                          <a:effectLst/>
-                          <a:latin typeface="Arial"/>
-                        </a:rPr>
-                        <a:t>6ª Semana</a:t>
-                      </a:r>
-                    </a:p>
-                  </a:txBody>
-                  <a:tcPr marL="9525" marR="9525" marT="9525" marB="0" anchor="b">
-                    <a:lnL w="6350" cap="flat" cmpd="sng" algn="ctr">
-                      <a:solidFill>
-                        <a:srgbClr val="000000"/>
-                      </a:solidFill>
-                      <a:prstDash val="dot"/>
-                      <a:round/>
-                      <a:headEnd type="none" w="med" len="med"/>
-                      <a:tailEnd type="none" w="med" len="med"/>
-                    </a:lnL>
-                    <a:lnR w="6350" cap="flat" cmpd="sng" algn="ctr">
-                      <a:solidFill>
-                        <a:srgbClr val="000000"/>
-                      </a:solidFill>
-                      <a:prstDash val="dot"/>
-                      <a:round/>
-                      <a:headEnd type="none" w="med" len="med"/>
-                      <a:tailEnd type="none" w="med" len="med"/>
-                    </a:lnR>
-                    <a:lnT w="6350" cap="flat" cmpd="sng" algn="ctr">
-                      <a:solidFill>
-                        <a:srgbClr val="000000"/>
-                      </a:solidFill>
-                      <a:prstDash val="dot"/>
-                      <a:round/>
-                      <a:headEnd type="none" w="med" len="med"/>
-                      <a:tailEnd type="none" w="med" len="med"/>
-                    </a:lnT>
-                    <a:lnB w="6350" cap="flat" cmpd="sng" algn="ctr">
-                      <a:solidFill>
-                        <a:srgbClr val="000000"/>
-                      </a:solidFill>
-                      <a:prstDash val="dot"/>
-                      <a:round/>
-                      <a:headEnd type="none" w="med" len="med"/>
-                      <a:tailEnd type="none" w="med" len="med"/>
-                    </a:lnB>
-                  </a:tcPr>
-                </a:tc>
-                <a:tc>
-                  <a:txBody>
-                    <a:bodyPr/>
-                    <a:lstStyle/>
-                    <a:p>
-                      <a:pPr algn="l" fontAlgn="b"/>
-                      <a:r>
-                        <a:rPr lang="pt-BR" sz="2800" b="0" i="0" u="none" strike="noStrike">
-                          <a:effectLst/>
-                          <a:latin typeface="Arial"/>
-                        </a:rPr>
-                        <a:t>Gerou</a:t>
-                      </a:r>
-                    </a:p>
-                  </a:txBody>
-                  <a:tcPr marL="9525" marR="9525" marT="9525" marB="0" anchor="b">
-                    <a:lnL w="6350" cap="flat" cmpd="sng" algn="ctr">
-                      <a:solidFill>
-                        <a:srgbClr val="000000"/>
-                      </a:solidFill>
-                      <a:prstDash val="dot"/>
-                      <a:round/>
-                      <a:headEnd type="none" w="med" len="med"/>
-                      <a:tailEnd type="none" w="med" len="med"/>
-                    </a:lnL>
-                    <a:lnR w="6350" cap="flat" cmpd="sng" algn="ctr">
-                      <a:solidFill>
-                        <a:srgbClr val="000000"/>
-                      </a:solidFill>
-                      <a:prstDash val="dot"/>
-                      <a:round/>
-                      <a:headEnd type="none" w="med" len="med"/>
-                      <a:tailEnd type="none" w="med" len="med"/>
-                    </a:lnR>
-                    <a:lnT w="6350" cap="flat" cmpd="sng" algn="ctr">
-                      <a:solidFill>
-                        <a:srgbClr val="000000"/>
-                      </a:solidFill>
-                      <a:prstDash val="dot"/>
-                      <a:round/>
-                      <a:headEnd type="none" w="med" len="med"/>
-                      <a:tailEnd type="none" w="med" len="med"/>
-                    </a:lnT>
-                    <a:lnB w="6350" cap="flat" cmpd="sng" algn="ctr">
-                      <a:solidFill>
-                        <a:srgbClr val="000000"/>
-                      </a:solidFill>
-                      <a:prstDash val="dot"/>
-                      <a:round/>
-                      <a:headEnd type="none" w="med" len="med"/>
-                      <a:tailEnd type="none" w="med" len="med"/>
-                    </a:lnB>
-                  </a:tcPr>
-                </a:tc>
-              </a:tr>
-              <a:tr h="477053">
-                <a:tc>
-                  <a:txBody>
-                    <a:bodyPr/>
-                    <a:lstStyle/>
-                    <a:p>
-                      <a:pPr algn="l" fontAlgn="b"/>
-                      <a:r>
-                        <a:rPr lang="pt-BR" sz="2800" b="0" i="0" u="none" strike="noStrike">
-                          <a:effectLst/>
-                          <a:latin typeface="Arial"/>
-                        </a:rPr>
-                        <a:t>Manutenção corretiva e testes finais</a:t>
-                      </a:r>
-                    </a:p>
-                  </a:txBody>
-                  <a:tcPr marL="9525" marR="9525" marT="9525" marB="0" anchor="b">
-                    <a:lnL w="6350" cap="flat" cmpd="sng" algn="ctr">
-                      <a:solidFill>
-                        <a:srgbClr val="000000"/>
-                      </a:solidFill>
-                      <a:prstDash val="dot"/>
-                      <a:round/>
-                      <a:headEnd type="none" w="med" len="med"/>
-                      <a:tailEnd type="none" w="med" len="med"/>
-                    </a:lnL>
-                    <a:lnR w="6350" cap="flat" cmpd="sng" algn="ctr">
-                      <a:solidFill>
-                        <a:srgbClr val="000000"/>
-                      </a:solidFill>
-                      <a:prstDash val="dot"/>
-                      <a:round/>
-                      <a:headEnd type="none" w="med" len="med"/>
-                      <a:tailEnd type="none" w="med" len="med"/>
-                    </a:lnR>
-                    <a:lnT w="6350" cap="flat" cmpd="sng" algn="ctr">
-                      <a:solidFill>
-                        <a:srgbClr val="000000"/>
-                      </a:solidFill>
-                      <a:prstDash val="dot"/>
-                      <a:round/>
-                      <a:headEnd type="none" w="med" len="med"/>
-                      <a:tailEnd type="none" w="med" len="med"/>
-                    </a:lnT>
-                    <a:lnB w="6350" cap="flat" cmpd="sng" algn="ctr">
-                      <a:solidFill>
-                        <a:srgbClr val="000000"/>
-                      </a:solidFill>
-                      <a:prstDash val="dot"/>
-                      <a:round/>
-                      <a:headEnd type="none" w="med" len="med"/>
-                      <a:tailEnd type="none" w="med" len="med"/>
-                    </a:lnB>
-                  </a:tcPr>
-                </a:tc>
-                <a:tc>
-                  <a:txBody>
-                    <a:bodyPr/>
-                    <a:lstStyle/>
-                    <a:p>
-                      <a:pPr algn="l" fontAlgn="b"/>
-                      <a:r>
-                        <a:rPr lang="pt-BR" sz="2800" b="0" i="0" u="none" strike="noStrike" dirty="0">
-                          <a:effectLst/>
-                          <a:latin typeface="Arial"/>
-                        </a:rPr>
-                        <a:t>Programa Final</a:t>
-                      </a:r>
-                    </a:p>
-                  </a:txBody>
-                  <a:tcPr marL="9525" marR="9525" marT="9525" marB="0" anchor="b">
-                    <a:lnL w="6350" cap="flat" cmpd="sng" algn="ctr">
-                      <a:solidFill>
-                        <a:srgbClr val="000000"/>
-                      </a:solidFill>
-                      <a:prstDash val="dot"/>
-                      <a:round/>
-                      <a:headEnd type="none" w="med" len="med"/>
-                      <a:tailEnd type="none" w="med" len="med"/>
-                    </a:lnL>
-                    <a:lnR w="6350" cap="flat" cmpd="sng" algn="ctr">
-                      <a:solidFill>
-                        <a:srgbClr val="000000"/>
-                      </a:solidFill>
-                      <a:prstDash val="dot"/>
-                      <a:round/>
-                      <a:headEnd type="none" w="med" len="med"/>
-                      <a:tailEnd type="none" w="med" len="med"/>
-                    </a:lnR>
-                    <a:lnT w="6350" cap="flat" cmpd="sng" algn="ctr">
-                      <a:solidFill>
-                        <a:srgbClr val="000000"/>
-                      </a:solidFill>
-                      <a:prstDash val="dot"/>
-                      <a:round/>
-                      <a:headEnd type="none" w="med" len="med"/>
-                      <a:tailEnd type="none" w="med" len="med"/>
-                    </a:lnT>
-                    <a:lnB w="6350" cap="flat" cmpd="sng" algn="ctr">
-                      <a:solidFill>
-                        <a:srgbClr val="000000"/>
-                      </a:solidFill>
-                      <a:prstDash val="dot"/>
-                      <a:round/>
-                      <a:headEnd type="none" w="med" len="med"/>
-                      <a:tailEnd type="none" w="med" len="med"/>
-                    </a:lnB>
-                  </a:tcPr>
-                </a:tc>
-              </a:tr>
-            </a:tbl>
-          </a:graphicData>
-        </a:graphic>
-      </p:graphicFrame>
-    </p:spTree>
-    <p:extLst>
-      <p:ext uri="{BB962C8B-B14F-4D97-AF65-F5344CB8AC3E}">
-        <p14:creationId xmlns="" xmlns:p14="http://schemas.microsoft.com/office/powerpoint/2010/main" val="2646964981"/>
-      </p:ext>
-    </p:extLst>
-  </p:cSld>
-  <p:clrMapOvr>
-    <a:masterClrMapping/>
-  </p:clrMapOvr>
-  <p:transition>
-    <p:cover/>
-  </p:transition>
-  <p:timing>
-    <p:tnLst>
-      <p:par>
-        <p:cTn id="1" dur="indefinite" restart="never" nodeType="tmRoot"/>
-      </p:par>
-    </p:tnLst>
-  </p:timing>
-</p:sld>
-</file>
-
-<file path=ppt/slides/slide11.xml><?xml version="1.0" encoding="utf-8"?>
 <p:sld xmlns:a="http://schemas.openxmlformats.org/drawingml/2006/main" xmlns:r="http://schemas.openxmlformats.org/officeDocument/2006/relationships" xmlns:p="http://schemas.openxmlformats.org/presentationml/2006/main">
   <p:cSld>
     <p:spTree>
@@ -4984,7 +4093,7 @@
     </p:spTree>
     <p:extLst>
       <p:ext uri="{BB962C8B-B14F-4D97-AF65-F5344CB8AC3E}">
-        <p14:creationId xmlns="" xmlns:p14="http://schemas.microsoft.com/office/powerpoint/2010/main" val="1567074162"/>
+        <p14:creationId xmlns:p14="http://schemas.microsoft.com/office/powerpoint/2010/main" val="1567074162"/>
       </p:ext>
     </p:extLst>
   </p:cSld>
@@ -5841,7 +4950,7 @@
     </p:spTree>
     <p:extLst>
       <p:ext uri="{BB962C8B-B14F-4D97-AF65-F5344CB8AC3E}">
-        <p14:creationId xmlns="" xmlns:p14="http://schemas.microsoft.com/office/powerpoint/2010/main" val="526639743"/>
+        <p14:creationId xmlns:p14="http://schemas.microsoft.com/office/powerpoint/2010/main" val="526639743"/>
       </p:ext>
     </p:extLst>
   </p:cSld>
@@ -6690,92 +5799,6 @@
           <a:lstStyle/>
           <a:p>
             <a:r>
-              <a:rPr lang="pt-BR" dirty="0" err="1" smtClean="0"/>
-              <a:t>OpenProject</a:t>
-            </a:r>
-            <a:r>
-              <a:rPr lang="pt-BR" dirty="0" smtClean="0"/>
-              <a:t>?</a:t>
-            </a:r>
-            <a:endParaRPr lang="pt-BR" dirty="0"/>
-          </a:p>
-        </p:txBody>
-      </p:sp>
-      <p:pic>
-        <p:nvPicPr>
-          <p:cNvPr id="1026" name="Picture 2"/>
-          <p:cNvPicPr>
-            <a:picLocks noGrp="1" noChangeAspect="1" noChangeArrowheads="1"/>
-          </p:cNvPicPr>
-          <p:nvPr>
-            <p:ph idx="1"/>
-          </p:nvPr>
-        </p:nvPicPr>
-        <p:blipFill>
-          <a:blip r:embed="rId2" cstate="print"/>
-          <a:srcRect/>
-          <a:stretch>
-            <a:fillRect/>
-          </a:stretch>
-        </p:blipFill>
-        <p:spPr bwMode="auto">
-          <a:xfrm>
-            <a:off x="457200" y="1620865"/>
-            <a:ext cx="8229600" cy="4484632"/>
-          </a:xfrm>
-          <a:prstGeom prst="rect">
-            <a:avLst/>
-          </a:prstGeom>
-          <a:noFill/>
-          <a:ln w="9525">
-            <a:noFill/>
-            <a:miter lim="800000"/>
-            <a:headEnd/>
-            <a:tailEnd/>
-          </a:ln>
-        </p:spPr>
-      </p:pic>
-    </p:spTree>
-  </p:cSld>
-  <p:clrMapOvr>
-    <a:masterClrMapping/>
-  </p:clrMapOvr>
-</p:sld>
-</file>
-
-<file path=ppt/slides/slide7.xml><?xml version="1.0" encoding="utf-8"?>
-<p:sld xmlns:a="http://schemas.openxmlformats.org/drawingml/2006/main" xmlns:r="http://schemas.openxmlformats.org/officeDocument/2006/relationships" xmlns:p="http://schemas.openxmlformats.org/presentationml/2006/main">
-  <p:cSld>
-    <p:spTree>
-      <p:nvGrpSpPr>
-        <p:cNvPr id="1" name=""/>
-        <p:cNvGrpSpPr/>
-        <p:nvPr/>
-      </p:nvGrpSpPr>
-      <p:grpSpPr>
-        <a:xfrm>
-          <a:off x="0" y="0"/>
-          <a:ext cx="0" cy="0"/>
-          <a:chOff x="0" y="0"/>
-          <a:chExt cx="0" cy="0"/>
-        </a:xfrm>
-      </p:grpSpPr>
-      <p:sp>
-        <p:nvSpPr>
-          <p:cNvPr id="2" name="Title 1"/>
-          <p:cNvSpPr>
-            <a:spLocks noGrp="1"/>
-          </p:cNvSpPr>
-          <p:nvPr>
-            <p:ph type="title"/>
-          </p:nvPr>
-        </p:nvSpPr>
-        <p:spPr/>
-        <p:txBody>
-          <a:bodyPr/>
-          <a:lstStyle/>
-          <a:p>
-            <a:r>
               <a:rPr lang="pt-BR" dirty="0" smtClean="0"/>
               <a:t>Excel</a:t>
             </a:r>
@@ -6822,10 +5845,17 @@
   <p:clrMapOvr>
     <a:masterClrMapping/>
   </p:clrMapOvr>
+  <p:timing>
+    <p:tnLst>
+      <p:par>
+        <p:cTn id="1" dur="indefinite" restart="never" nodeType="tmRoot"/>
+      </p:par>
+    </p:tnLst>
+  </p:timing>
 </p:sld>
 </file>
 
-<file path=ppt/slides/slide8.xml><?xml version="1.0" encoding="utf-8"?>
+<file path=ppt/slides/slide7.xml><?xml version="1.0" encoding="utf-8"?>
 <p:sld xmlns:a="http://schemas.openxmlformats.org/drawingml/2006/main" xmlns:r="http://schemas.openxmlformats.org/officeDocument/2006/relationships" xmlns:p="http://schemas.openxmlformats.org/presentationml/2006/main">
   <p:cSld>
     <p:spTree>
@@ -6851,7 +5881,7 @@
           <p:nvPr>
             <p:extLst>
               <p:ext uri="{D42A27DB-BD31-4B8C-83A1-F6EECF244321}">
-                <p14:modId xmlns="" xmlns:p14="http://schemas.microsoft.com/office/powerpoint/2010/main" val="2877445285"/>
+                <p14:modId xmlns:p14="http://schemas.microsoft.com/office/powerpoint/2010/main" val="529218093"/>
               </p:ext>
             </p:extLst>
           </p:nvPr>
@@ -7488,11 +6518,32 @@
                     <a:p>
                       <a:pPr algn="l" fontAlgn="b"/>
                       <a:r>
+                        <a:rPr lang="pt-BR" sz="2800" b="0" i="0" u="none" strike="noStrike" dirty="0">
+                          <a:effectLst/>
+                          <a:latin typeface="Arial"/>
+                        </a:rPr>
+                        <a:t>Definição </a:t>
+                      </a:r>
+                      <a:r>
                         <a:rPr lang="pt-BR" sz="2800" b="0" i="0" u="none" strike="noStrike">
                           <a:effectLst/>
                           <a:latin typeface="Arial"/>
                         </a:rPr>
-                        <a:t>Definição do medelo de classes</a:t>
+                        <a:t>do </a:t>
+                      </a:r>
+                      <a:r>
+                        <a:rPr lang="pt-BR" sz="2800" b="0" i="0" u="none" strike="noStrike" smtClean="0">
+                          <a:effectLst/>
+                          <a:latin typeface="Arial"/>
+                        </a:rPr>
+                        <a:t>modelo </a:t>
+                      </a:r>
+                      <a:r>
+                        <a:rPr lang="pt-BR" sz="2800" b="0" i="0" u="none" strike="noStrike" dirty="0">
+                          <a:effectLst/>
+                          <a:latin typeface="Arial"/>
+                        </a:rPr>
+                        <a:t>de classes</a:t>
                       </a:r>
                     </a:p>
                   </a:txBody>
@@ -7597,7 +6648,872 @@
     </p:spTree>
     <p:extLst>
       <p:ext uri="{BB962C8B-B14F-4D97-AF65-F5344CB8AC3E}">
-        <p14:creationId xmlns="" xmlns:p14="http://schemas.microsoft.com/office/powerpoint/2010/main" val="2518254064"/>
+        <p14:creationId xmlns:p14="http://schemas.microsoft.com/office/powerpoint/2010/main" val="2518254064"/>
+      </p:ext>
+    </p:extLst>
+  </p:cSld>
+  <p:clrMapOvr>
+    <a:masterClrMapping/>
+  </p:clrMapOvr>
+  <p:transition>
+    <p:cover/>
+  </p:transition>
+  <p:timing>
+    <p:tnLst>
+      <p:par>
+        <p:cTn id="1" dur="indefinite" restart="never" nodeType="tmRoot"/>
+      </p:par>
+    </p:tnLst>
+  </p:timing>
+</p:sld>
+</file>
+
+<file path=ppt/slides/slide8.xml><?xml version="1.0" encoding="utf-8"?>
+<p:sld xmlns:a="http://schemas.openxmlformats.org/drawingml/2006/main" xmlns:r="http://schemas.openxmlformats.org/officeDocument/2006/relationships" xmlns:p="http://schemas.openxmlformats.org/presentationml/2006/main">
+  <p:cSld>
+    <p:spTree>
+      <p:nvGrpSpPr>
+        <p:cNvPr id="1" name=""/>
+        <p:cNvGrpSpPr/>
+        <p:nvPr/>
+      </p:nvGrpSpPr>
+      <p:grpSpPr>
+        <a:xfrm>
+          <a:off x="0" y="0"/>
+          <a:ext cx="0" cy="0"/>
+          <a:chOff x="0" y="0"/>
+          <a:chExt cx="0" cy="0"/>
+        </a:xfrm>
+      </p:grpSpPr>
+      <p:graphicFrame>
+        <p:nvGraphicFramePr>
+          <p:cNvPr id="2" name="Tabela 1"/>
+          <p:cNvGraphicFramePr>
+            <a:graphicFrameLocks noGrp="1"/>
+          </p:cNvGraphicFramePr>
+          <p:nvPr>
+            <p:extLst>
+              <p:ext uri="{D42A27DB-BD31-4B8C-83A1-F6EECF244321}">
+                <p14:modId xmlns:p14="http://schemas.microsoft.com/office/powerpoint/2010/main" val="2730804079"/>
+              </p:ext>
+            </p:extLst>
+          </p:nvPr>
+        </p:nvGraphicFramePr>
+        <p:xfrm>
+          <a:off x="107504" y="1268760"/>
+          <a:ext cx="8848774" cy="4289280"/>
+        </p:xfrm>
+        <a:graphic>
+          <a:graphicData uri="http://schemas.openxmlformats.org/drawingml/2006/table">
+            <a:tbl>
+              <a:tblPr/>
+              <a:tblGrid>
+                <a:gridCol w="5976664"/>
+                <a:gridCol w="2872110"/>
+              </a:tblGrid>
+              <a:tr h="604260">
+                <a:tc>
+                  <a:txBody>
+                    <a:bodyPr/>
+                    <a:lstStyle/>
+                    <a:p>
+                      <a:pPr algn="l" fontAlgn="b"/>
+                      <a:r>
+                        <a:rPr lang="pt-BR" sz="2000" b="0" i="0" u="none" strike="noStrike" dirty="0">
+                          <a:effectLst/>
+                          <a:latin typeface="Arial"/>
+                        </a:rPr>
+                        <a:t>3ª semana</a:t>
+                      </a:r>
+                    </a:p>
+                  </a:txBody>
+                  <a:tcPr marL="9525" marR="9525" marT="9525" marB="0" anchor="b">
+                    <a:lnL w="6350" cap="flat" cmpd="sng" algn="ctr">
+                      <a:solidFill>
+                        <a:srgbClr val="000000"/>
+                      </a:solidFill>
+                      <a:prstDash val="dot"/>
+                      <a:round/>
+                      <a:headEnd type="none" w="med" len="med"/>
+                      <a:tailEnd type="none" w="med" len="med"/>
+                    </a:lnL>
+                    <a:lnR w="6350" cap="flat" cmpd="sng" algn="ctr">
+                      <a:solidFill>
+                        <a:srgbClr val="000000"/>
+                      </a:solidFill>
+                      <a:prstDash val="dot"/>
+                      <a:round/>
+                      <a:headEnd type="none" w="med" len="med"/>
+                      <a:tailEnd type="none" w="med" len="med"/>
+                    </a:lnR>
+                    <a:lnT w="6350" cap="flat" cmpd="sng" algn="ctr">
+                      <a:solidFill>
+                        <a:srgbClr val="000000"/>
+                      </a:solidFill>
+                      <a:prstDash val="dot"/>
+                      <a:round/>
+                      <a:headEnd type="none" w="med" len="med"/>
+                      <a:tailEnd type="none" w="med" len="med"/>
+                    </a:lnT>
+                    <a:lnB w="6350" cap="flat" cmpd="sng" algn="ctr">
+                      <a:solidFill>
+                        <a:srgbClr val="000000"/>
+                      </a:solidFill>
+                      <a:prstDash val="dot"/>
+                      <a:round/>
+                      <a:headEnd type="none" w="med" len="med"/>
+                      <a:tailEnd type="none" w="med" len="med"/>
+                    </a:lnB>
+                  </a:tcPr>
+                </a:tc>
+                <a:tc>
+                  <a:txBody>
+                    <a:bodyPr/>
+                    <a:lstStyle/>
+                    <a:p>
+                      <a:pPr algn="l" fontAlgn="b"/>
+                      <a:r>
+                        <a:rPr lang="pt-BR" sz="2000" b="0" i="0" u="none" strike="noStrike">
+                          <a:effectLst/>
+                          <a:latin typeface="Arial"/>
+                        </a:rPr>
+                        <a:t>Gerou</a:t>
+                      </a:r>
+                    </a:p>
+                  </a:txBody>
+                  <a:tcPr marL="9525" marR="9525" marT="9525" marB="0" anchor="b">
+                    <a:lnL w="6350" cap="flat" cmpd="sng" algn="ctr">
+                      <a:solidFill>
+                        <a:srgbClr val="000000"/>
+                      </a:solidFill>
+                      <a:prstDash val="dot"/>
+                      <a:round/>
+                      <a:headEnd type="none" w="med" len="med"/>
+                      <a:tailEnd type="none" w="med" len="med"/>
+                    </a:lnL>
+                    <a:lnR w="6350" cap="flat" cmpd="sng" algn="ctr">
+                      <a:solidFill>
+                        <a:srgbClr val="000000"/>
+                      </a:solidFill>
+                      <a:prstDash val="dot"/>
+                      <a:round/>
+                      <a:headEnd type="none" w="med" len="med"/>
+                      <a:tailEnd type="none" w="med" len="med"/>
+                    </a:lnR>
+                    <a:lnT w="6350" cap="flat" cmpd="sng" algn="ctr">
+                      <a:solidFill>
+                        <a:srgbClr val="000000"/>
+                      </a:solidFill>
+                      <a:prstDash val="dot"/>
+                      <a:round/>
+                      <a:headEnd type="none" w="med" len="med"/>
+                      <a:tailEnd type="none" w="med" len="med"/>
+                    </a:lnT>
+                    <a:lnB w="6350" cap="flat" cmpd="sng" algn="ctr">
+                      <a:solidFill>
+                        <a:srgbClr val="000000"/>
+                      </a:solidFill>
+                      <a:prstDash val="dot"/>
+                      <a:round/>
+                      <a:headEnd type="none" w="med" len="med"/>
+                      <a:tailEnd type="none" w="med" len="med"/>
+                    </a:lnB>
+                  </a:tcPr>
+                </a:tc>
+              </a:tr>
+              <a:tr h="604260">
+                <a:tc>
+                  <a:txBody>
+                    <a:bodyPr/>
+                    <a:lstStyle/>
+                    <a:p>
+                      <a:pPr algn="l" fontAlgn="b"/>
+                      <a:r>
+                        <a:rPr lang="pt-BR" sz="2000" b="0" i="0" u="none" strike="noStrike" dirty="0">
+                          <a:effectLst/>
+                          <a:latin typeface="Arial"/>
+                        </a:rPr>
+                        <a:t>Escolha do paradigma de desenvolvimento a ser </a:t>
+                      </a:r>
+                      <a:r>
+                        <a:rPr lang="pt-BR" sz="2000" b="0" i="0" u="none" strike="noStrike" dirty="0" smtClean="0">
+                          <a:effectLst/>
+                          <a:latin typeface="Arial"/>
+                        </a:rPr>
+                        <a:t>utilizado</a:t>
+                      </a:r>
+                      <a:endParaRPr lang="pt-BR" sz="2000" b="0" i="0" u="none" strike="noStrike" dirty="0">
+                        <a:effectLst/>
+                        <a:latin typeface="Arial"/>
+                      </a:endParaRPr>
+                    </a:p>
+                  </a:txBody>
+                  <a:tcPr marL="9525" marR="9525" marT="9525" marB="0" anchor="b">
+                    <a:lnL w="6350" cap="flat" cmpd="sng" algn="ctr">
+                      <a:solidFill>
+                        <a:srgbClr val="000000"/>
+                      </a:solidFill>
+                      <a:prstDash val="dot"/>
+                      <a:round/>
+                      <a:headEnd type="none" w="med" len="med"/>
+                      <a:tailEnd type="none" w="med" len="med"/>
+                    </a:lnL>
+                    <a:lnR w="6350" cap="flat" cmpd="sng" algn="ctr">
+                      <a:solidFill>
+                        <a:srgbClr val="000000"/>
+                      </a:solidFill>
+                      <a:prstDash val="dot"/>
+                      <a:round/>
+                      <a:headEnd type="none" w="med" len="med"/>
+                      <a:tailEnd type="none" w="med" len="med"/>
+                    </a:lnR>
+                    <a:lnT w="6350" cap="flat" cmpd="sng" algn="ctr">
+                      <a:solidFill>
+                        <a:srgbClr val="000000"/>
+                      </a:solidFill>
+                      <a:prstDash val="dot"/>
+                      <a:round/>
+                      <a:headEnd type="none" w="med" len="med"/>
+                      <a:tailEnd type="none" w="med" len="med"/>
+                    </a:lnT>
+                    <a:lnB w="6350" cap="flat" cmpd="sng" algn="ctr">
+                      <a:solidFill>
+                        <a:srgbClr val="000000"/>
+                      </a:solidFill>
+                      <a:prstDash val="dot"/>
+                      <a:round/>
+                      <a:headEnd type="none" w="med" len="med"/>
+                      <a:tailEnd type="none" w="med" len="med"/>
+                    </a:lnB>
+                  </a:tcPr>
+                </a:tc>
+                <a:tc>
+                  <a:txBody>
+                    <a:bodyPr/>
+                    <a:lstStyle/>
+                    <a:p>
+                      <a:pPr algn="l" fontAlgn="b"/>
+                      <a:r>
+                        <a:rPr lang="pt-BR" sz="2000" b="0" i="0" u="none" strike="noStrike" dirty="0" smtClean="0">
+                          <a:effectLst/>
+                          <a:latin typeface="Arial"/>
+                        </a:rPr>
+                        <a:t>Modelo </a:t>
+                      </a:r>
+                      <a:r>
+                        <a:rPr lang="pt-BR" sz="2000" b="0" i="0" u="none" strike="noStrike" dirty="0" err="1">
+                          <a:effectLst/>
+                          <a:latin typeface="Arial"/>
+                        </a:rPr>
+                        <a:t>logico</a:t>
+                      </a:r>
+                      <a:r>
+                        <a:rPr lang="pt-BR" sz="2000" b="0" i="0" u="none" strike="noStrike" dirty="0">
+                          <a:effectLst/>
+                          <a:latin typeface="Arial"/>
+                        </a:rPr>
+                        <a:t> do BD</a:t>
+                      </a:r>
+                    </a:p>
+                  </a:txBody>
+                  <a:tcPr marL="9525" marR="9525" marT="9525" marB="0" anchor="b">
+                    <a:lnL w="6350" cap="flat" cmpd="sng" algn="ctr">
+                      <a:solidFill>
+                        <a:srgbClr val="000000"/>
+                      </a:solidFill>
+                      <a:prstDash val="dot"/>
+                      <a:round/>
+                      <a:headEnd type="none" w="med" len="med"/>
+                      <a:tailEnd type="none" w="med" len="med"/>
+                    </a:lnL>
+                    <a:lnR w="6350" cap="flat" cmpd="sng" algn="ctr">
+                      <a:solidFill>
+                        <a:srgbClr val="000000"/>
+                      </a:solidFill>
+                      <a:prstDash val="dot"/>
+                      <a:round/>
+                      <a:headEnd type="none" w="med" len="med"/>
+                      <a:tailEnd type="none" w="med" len="med"/>
+                    </a:lnR>
+                    <a:lnT w="6350" cap="flat" cmpd="sng" algn="ctr">
+                      <a:solidFill>
+                        <a:srgbClr val="000000"/>
+                      </a:solidFill>
+                      <a:prstDash val="dot"/>
+                      <a:round/>
+                      <a:headEnd type="none" w="med" len="med"/>
+                      <a:tailEnd type="none" w="med" len="med"/>
+                    </a:lnT>
+                    <a:lnB w="6350" cap="flat" cmpd="sng" algn="ctr">
+                      <a:solidFill>
+                        <a:srgbClr val="000000"/>
+                      </a:solidFill>
+                      <a:prstDash val="dot"/>
+                      <a:round/>
+                      <a:headEnd type="none" w="med" len="med"/>
+                      <a:tailEnd type="none" w="med" len="med"/>
+                    </a:lnB>
+                  </a:tcPr>
+                </a:tc>
+              </a:tr>
+              <a:tr h="604260">
+                <a:tc>
+                  <a:txBody>
+                    <a:bodyPr/>
+                    <a:lstStyle/>
+                    <a:p>
+                      <a:pPr algn="l" fontAlgn="b"/>
+                      <a:r>
+                        <a:rPr lang="pt-BR" sz="2000" b="0" i="0" u="none" strike="noStrike">
+                          <a:effectLst/>
+                          <a:latin typeface="Arial"/>
+                        </a:rPr>
+                        <a:t>Escolha da linguagem utilizada</a:t>
+                      </a:r>
+                    </a:p>
+                  </a:txBody>
+                  <a:tcPr marL="9525" marR="9525" marT="9525" marB="0" anchor="b">
+                    <a:lnL w="6350" cap="flat" cmpd="sng" algn="ctr">
+                      <a:solidFill>
+                        <a:srgbClr val="000000"/>
+                      </a:solidFill>
+                      <a:prstDash val="dot"/>
+                      <a:round/>
+                      <a:headEnd type="none" w="med" len="med"/>
+                      <a:tailEnd type="none" w="med" len="med"/>
+                    </a:lnL>
+                    <a:lnR w="6350" cap="flat" cmpd="sng" algn="ctr">
+                      <a:solidFill>
+                        <a:srgbClr val="000000"/>
+                      </a:solidFill>
+                      <a:prstDash val="dot"/>
+                      <a:round/>
+                      <a:headEnd type="none" w="med" len="med"/>
+                      <a:tailEnd type="none" w="med" len="med"/>
+                    </a:lnR>
+                    <a:lnT w="6350" cap="flat" cmpd="sng" algn="ctr">
+                      <a:solidFill>
+                        <a:srgbClr val="000000"/>
+                      </a:solidFill>
+                      <a:prstDash val="dot"/>
+                      <a:round/>
+                      <a:headEnd type="none" w="med" len="med"/>
+                      <a:tailEnd type="none" w="med" len="med"/>
+                    </a:lnT>
+                    <a:lnB w="6350" cap="flat" cmpd="sng" algn="ctr">
+                      <a:solidFill>
+                        <a:srgbClr val="000000"/>
+                      </a:solidFill>
+                      <a:prstDash val="dot"/>
+                      <a:round/>
+                      <a:headEnd type="none" w="med" len="med"/>
+                      <a:tailEnd type="none" w="med" len="med"/>
+                    </a:lnB>
+                  </a:tcPr>
+                </a:tc>
+                <a:tc>
+                  <a:txBody>
+                    <a:bodyPr/>
+                    <a:lstStyle/>
+                    <a:p>
+                      <a:pPr algn="l" fontAlgn="b"/>
+                      <a:r>
+                        <a:rPr lang="pt-BR" sz="2000" b="0" i="0" u="none" strike="noStrike">
+                          <a:effectLst/>
+                          <a:latin typeface="Arial"/>
+                        </a:rPr>
+                        <a:t>Prévia da interface</a:t>
+                      </a:r>
+                    </a:p>
+                  </a:txBody>
+                  <a:tcPr marL="9525" marR="9525" marT="9525" marB="0" anchor="b">
+                    <a:lnL w="6350" cap="flat" cmpd="sng" algn="ctr">
+                      <a:solidFill>
+                        <a:srgbClr val="000000"/>
+                      </a:solidFill>
+                      <a:prstDash val="dot"/>
+                      <a:round/>
+                      <a:headEnd type="none" w="med" len="med"/>
+                      <a:tailEnd type="none" w="med" len="med"/>
+                    </a:lnL>
+                    <a:lnR w="6350" cap="flat" cmpd="sng" algn="ctr">
+                      <a:solidFill>
+                        <a:srgbClr val="000000"/>
+                      </a:solidFill>
+                      <a:prstDash val="dot"/>
+                      <a:round/>
+                      <a:headEnd type="none" w="med" len="med"/>
+                      <a:tailEnd type="none" w="med" len="med"/>
+                    </a:lnR>
+                    <a:lnT w="6350" cap="flat" cmpd="sng" algn="ctr">
+                      <a:solidFill>
+                        <a:srgbClr val="000000"/>
+                      </a:solidFill>
+                      <a:prstDash val="dot"/>
+                      <a:round/>
+                      <a:headEnd type="none" w="med" len="med"/>
+                      <a:tailEnd type="none" w="med" len="med"/>
+                    </a:lnT>
+                    <a:lnB w="6350" cap="flat" cmpd="sng" algn="ctr">
+                      <a:solidFill>
+                        <a:srgbClr val="000000"/>
+                      </a:solidFill>
+                      <a:prstDash val="dot"/>
+                      <a:round/>
+                      <a:headEnd type="none" w="med" len="med"/>
+                      <a:tailEnd type="none" w="med" len="med"/>
+                    </a:lnB>
+                  </a:tcPr>
+                </a:tc>
+              </a:tr>
+              <a:tr h="604260">
+                <a:tc>
+                  <a:txBody>
+                    <a:bodyPr/>
+                    <a:lstStyle/>
+                    <a:p>
+                      <a:pPr algn="l" fontAlgn="b"/>
+                      <a:r>
+                        <a:rPr lang="pt-BR" sz="2000" b="0" i="0" u="none" strike="noStrike">
+                          <a:effectLst/>
+                          <a:latin typeface="Arial"/>
+                        </a:rPr>
+                        <a:t>Escolha das IDEs e sistemas operacionais, computadores</a:t>
+                      </a:r>
+                    </a:p>
+                  </a:txBody>
+                  <a:tcPr marL="9525" marR="9525" marT="9525" marB="0" anchor="b">
+                    <a:lnL w="6350" cap="flat" cmpd="sng" algn="ctr">
+                      <a:solidFill>
+                        <a:srgbClr val="000000"/>
+                      </a:solidFill>
+                      <a:prstDash val="dot"/>
+                      <a:round/>
+                      <a:headEnd type="none" w="med" len="med"/>
+                      <a:tailEnd type="none" w="med" len="med"/>
+                    </a:lnL>
+                    <a:lnR w="6350" cap="flat" cmpd="sng" algn="ctr">
+                      <a:solidFill>
+                        <a:srgbClr val="000000"/>
+                      </a:solidFill>
+                      <a:prstDash val="dot"/>
+                      <a:round/>
+                      <a:headEnd type="none" w="med" len="med"/>
+                      <a:tailEnd type="none" w="med" len="med"/>
+                    </a:lnR>
+                    <a:lnT w="6350" cap="flat" cmpd="sng" algn="ctr">
+                      <a:solidFill>
+                        <a:srgbClr val="000000"/>
+                      </a:solidFill>
+                      <a:prstDash val="dot"/>
+                      <a:round/>
+                      <a:headEnd type="none" w="med" len="med"/>
+                      <a:tailEnd type="none" w="med" len="med"/>
+                    </a:lnT>
+                    <a:lnB w="6350" cap="flat" cmpd="sng" algn="ctr">
+                      <a:solidFill>
+                        <a:srgbClr val="000000"/>
+                      </a:solidFill>
+                      <a:prstDash val="dot"/>
+                      <a:round/>
+                      <a:headEnd type="none" w="med" len="med"/>
+                      <a:tailEnd type="none" w="med" len="med"/>
+                    </a:lnB>
+                  </a:tcPr>
+                </a:tc>
+                <a:tc>
+                  <a:txBody>
+                    <a:bodyPr/>
+                    <a:lstStyle/>
+                    <a:p>
+                      <a:pPr algn="l" fontAlgn="b"/>
+                      <a:r>
+                        <a:rPr lang="pt-BR" sz="2000" b="0" i="0" u="none" strike="noStrike">
+                          <a:effectLst/>
+                          <a:latin typeface="Arial"/>
+                        </a:rPr>
+                        <a:t> </a:t>
+                      </a:r>
+                    </a:p>
+                  </a:txBody>
+                  <a:tcPr marL="9525" marR="9525" marT="9525" marB="0" anchor="b">
+                    <a:lnL w="6350" cap="flat" cmpd="sng" algn="ctr">
+                      <a:solidFill>
+                        <a:srgbClr val="000000"/>
+                      </a:solidFill>
+                      <a:prstDash val="dot"/>
+                      <a:round/>
+                      <a:headEnd type="none" w="med" len="med"/>
+                      <a:tailEnd type="none" w="med" len="med"/>
+                    </a:lnL>
+                    <a:lnR w="6350" cap="flat" cmpd="sng" algn="ctr">
+                      <a:solidFill>
+                        <a:srgbClr val="000000"/>
+                      </a:solidFill>
+                      <a:prstDash val="dot"/>
+                      <a:round/>
+                      <a:headEnd type="none" w="med" len="med"/>
+                      <a:tailEnd type="none" w="med" len="med"/>
+                    </a:lnR>
+                    <a:lnT w="6350" cap="flat" cmpd="sng" algn="ctr">
+                      <a:solidFill>
+                        <a:srgbClr val="000000"/>
+                      </a:solidFill>
+                      <a:prstDash val="dot"/>
+                      <a:round/>
+                      <a:headEnd type="none" w="med" len="med"/>
+                      <a:tailEnd type="none" w="med" len="med"/>
+                    </a:lnT>
+                    <a:lnB w="6350" cap="flat" cmpd="sng" algn="ctr">
+                      <a:solidFill>
+                        <a:srgbClr val="000000"/>
+                      </a:solidFill>
+                      <a:prstDash val="dot"/>
+                      <a:round/>
+                      <a:headEnd type="none" w="med" len="med"/>
+                      <a:tailEnd type="none" w="med" len="med"/>
+                    </a:lnB>
+                  </a:tcPr>
+                </a:tc>
+              </a:tr>
+              <a:tr h="604260">
+                <a:tc>
+                  <a:txBody>
+                    <a:bodyPr/>
+                    <a:lstStyle/>
+                    <a:p>
+                      <a:pPr algn="l" fontAlgn="b"/>
+                      <a:r>
+                        <a:rPr lang="pt-BR" sz="2000" b="0" i="0" u="none" strike="noStrike">
+                          <a:effectLst/>
+                          <a:latin typeface="Arial"/>
+                        </a:rPr>
+                        <a:t>Definição de qual parte cada integrante ficara responsavel</a:t>
+                      </a:r>
+                    </a:p>
+                  </a:txBody>
+                  <a:tcPr marL="9525" marR="9525" marT="9525" marB="0" anchor="b">
+                    <a:lnL w="6350" cap="flat" cmpd="sng" algn="ctr">
+                      <a:solidFill>
+                        <a:srgbClr val="000000"/>
+                      </a:solidFill>
+                      <a:prstDash val="dot"/>
+                      <a:round/>
+                      <a:headEnd type="none" w="med" len="med"/>
+                      <a:tailEnd type="none" w="med" len="med"/>
+                    </a:lnL>
+                    <a:lnR w="6350" cap="flat" cmpd="sng" algn="ctr">
+                      <a:solidFill>
+                        <a:srgbClr val="000000"/>
+                      </a:solidFill>
+                      <a:prstDash val="dot"/>
+                      <a:round/>
+                      <a:headEnd type="none" w="med" len="med"/>
+                      <a:tailEnd type="none" w="med" len="med"/>
+                    </a:lnR>
+                    <a:lnT w="6350" cap="flat" cmpd="sng" algn="ctr">
+                      <a:solidFill>
+                        <a:srgbClr val="000000"/>
+                      </a:solidFill>
+                      <a:prstDash val="dot"/>
+                      <a:round/>
+                      <a:headEnd type="none" w="med" len="med"/>
+                      <a:tailEnd type="none" w="med" len="med"/>
+                    </a:lnT>
+                    <a:lnB w="6350" cap="flat" cmpd="sng" algn="ctr">
+                      <a:solidFill>
+                        <a:srgbClr val="000000"/>
+                      </a:solidFill>
+                      <a:prstDash val="dot"/>
+                      <a:round/>
+                      <a:headEnd type="none" w="med" len="med"/>
+                      <a:tailEnd type="none" w="med" len="med"/>
+                    </a:lnB>
+                  </a:tcPr>
+                </a:tc>
+                <a:tc>
+                  <a:txBody>
+                    <a:bodyPr/>
+                    <a:lstStyle/>
+                    <a:p>
+                      <a:pPr algn="l" fontAlgn="b"/>
+                      <a:r>
+                        <a:rPr lang="pt-BR" sz="2000" b="0" i="0" u="none" strike="noStrike">
+                          <a:effectLst/>
+                          <a:latin typeface="Arial"/>
+                        </a:rPr>
+                        <a:t> </a:t>
+                      </a:r>
+                    </a:p>
+                  </a:txBody>
+                  <a:tcPr marL="9525" marR="9525" marT="9525" marB="0" anchor="b">
+                    <a:lnL w="6350" cap="flat" cmpd="sng" algn="ctr">
+                      <a:solidFill>
+                        <a:srgbClr val="000000"/>
+                      </a:solidFill>
+                      <a:prstDash val="dot"/>
+                      <a:round/>
+                      <a:headEnd type="none" w="med" len="med"/>
+                      <a:tailEnd type="none" w="med" len="med"/>
+                    </a:lnL>
+                    <a:lnR w="6350" cap="flat" cmpd="sng" algn="ctr">
+                      <a:solidFill>
+                        <a:srgbClr val="000000"/>
+                      </a:solidFill>
+                      <a:prstDash val="dot"/>
+                      <a:round/>
+                      <a:headEnd type="none" w="med" len="med"/>
+                      <a:tailEnd type="none" w="med" len="med"/>
+                    </a:lnR>
+                    <a:lnT w="6350" cap="flat" cmpd="sng" algn="ctr">
+                      <a:solidFill>
+                        <a:srgbClr val="000000"/>
+                      </a:solidFill>
+                      <a:prstDash val="dot"/>
+                      <a:round/>
+                      <a:headEnd type="none" w="med" len="med"/>
+                      <a:tailEnd type="none" w="med" len="med"/>
+                    </a:lnT>
+                    <a:lnB w="6350" cap="flat" cmpd="sng" algn="ctr">
+                      <a:solidFill>
+                        <a:srgbClr val="000000"/>
+                      </a:solidFill>
+                      <a:prstDash val="dot"/>
+                      <a:round/>
+                      <a:headEnd type="none" w="med" len="med"/>
+                      <a:tailEnd type="none" w="med" len="med"/>
+                    </a:lnB>
+                  </a:tcPr>
+                </a:tc>
+              </a:tr>
+              <a:tr h="604260">
+                <a:tc>
+                  <a:txBody>
+                    <a:bodyPr/>
+                    <a:lstStyle/>
+                    <a:p>
+                      <a:pPr algn="l" fontAlgn="b"/>
+                      <a:r>
+                        <a:rPr lang="pt-BR" sz="2000" b="0" i="0" u="none" strike="noStrike">
+                          <a:effectLst/>
+                          <a:latin typeface="Arial"/>
+                        </a:rPr>
+                        <a:t>Definição dos hardwares que serão utilizados</a:t>
+                      </a:r>
+                    </a:p>
+                  </a:txBody>
+                  <a:tcPr marL="9525" marR="9525" marT="9525" marB="0" anchor="b">
+                    <a:lnL w="6350" cap="flat" cmpd="sng" algn="ctr">
+                      <a:solidFill>
+                        <a:srgbClr val="000000"/>
+                      </a:solidFill>
+                      <a:prstDash val="dot"/>
+                      <a:round/>
+                      <a:headEnd type="none" w="med" len="med"/>
+                      <a:tailEnd type="none" w="med" len="med"/>
+                    </a:lnL>
+                    <a:lnR w="6350" cap="flat" cmpd="sng" algn="ctr">
+                      <a:solidFill>
+                        <a:srgbClr val="000000"/>
+                      </a:solidFill>
+                      <a:prstDash val="dot"/>
+                      <a:round/>
+                      <a:headEnd type="none" w="med" len="med"/>
+                      <a:tailEnd type="none" w="med" len="med"/>
+                    </a:lnR>
+                    <a:lnT w="6350" cap="flat" cmpd="sng" algn="ctr">
+                      <a:solidFill>
+                        <a:srgbClr val="000000"/>
+                      </a:solidFill>
+                      <a:prstDash val="dot"/>
+                      <a:round/>
+                      <a:headEnd type="none" w="med" len="med"/>
+                      <a:tailEnd type="none" w="med" len="med"/>
+                    </a:lnT>
+                    <a:lnB w="6350" cap="flat" cmpd="sng" algn="ctr">
+                      <a:solidFill>
+                        <a:srgbClr val="000000"/>
+                      </a:solidFill>
+                      <a:prstDash val="dot"/>
+                      <a:round/>
+                      <a:headEnd type="none" w="med" len="med"/>
+                      <a:tailEnd type="none" w="med" len="med"/>
+                    </a:lnB>
+                  </a:tcPr>
+                </a:tc>
+                <a:tc>
+                  <a:txBody>
+                    <a:bodyPr/>
+                    <a:lstStyle/>
+                    <a:p>
+                      <a:pPr algn="l" fontAlgn="b"/>
+                      <a:r>
+                        <a:rPr lang="pt-BR" sz="2000" b="0" i="0" u="none" strike="noStrike">
+                          <a:effectLst/>
+                          <a:latin typeface="Arial"/>
+                        </a:rPr>
+                        <a:t> </a:t>
+                      </a:r>
+                    </a:p>
+                  </a:txBody>
+                  <a:tcPr marL="9525" marR="9525" marT="9525" marB="0" anchor="b">
+                    <a:lnL w="6350" cap="flat" cmpd="sng" algn="ctr">
+                      <a:solidFill>
+                        <a:srgbClr val="000000"/>
+                      </a:solidFill>
+                      <a:prstDash val="dot"/>
+                      <a:round/>
+                      <a:headEnd type="none" w="med" len="med"/>
+                      <a:tailEnd type="none" w="med" len="med"/>
+                    </a:lnL>
+                    <a:lnR w="6350" cap="flat" cmpd="sng" algn="ctr">
+                      <a:solidFill>
+                        <a:srgbClr val="000000"/>
+                      </a:solidFill>
+                      <a:prstDash val="dot"/>
+                      <a:round/>
+                      <a:headEnd type="none" w="med" len="med"/>
+                      <a:tailEnd type="none" w="med" len="med"/>
+                    </a:lnR>
+                    <a:lnT w="6350" cap="flat" cmpd="sng" algn="ctr">
+                      <a:solidFill>
+                        <a:srgbClr val="000000"/>
+                      </a:solidFill>
+                      <a:prstDash val="dot"/>
+                      <a:round/>
+                      <a:headEnd type="none" w="med" len="med"/>
+                      <a:tailEnd type="none" w="med" len="med"/>
+                    </a:lnT>
+                    <a:lnB w="6350" cap="flat" cmpd="sng" algn="ctr">
+                      <a:solidFill>
+                        <a:srgbClr val="000000"/>
+                      </a:solidFill>
+                      <a:prstDash val="dot"/>
+                      <a:round/>
+                      <a:headEnd type="none" w="med" len="med"/>
+                      <a:tailEnd type="none" w="med" len="med"/>
+                    </a:lnB>
+                  </a:tcPr>
+                </a:tc>
+              </a:tr>
+              <a:tr h="604260">
+                <a:tc>
+                  <a:txBody>
+                    <a:bodyPr/>
+                    <a:lstStyle/>
+                    <a:p>
+                      <a:pPr algn="l" fontAlgn="b"/>
+                      <a:r>
+                        <a:rPr lang="pt-BR" sz="2000" b="0" i="0" u="none" strike="noStrike">
+                          <a:effectLst/>
+                          <a:latin typeface="Arial"/>
+                        </a:rPr>
+                        <a:t>Esboço do modelo lógico do banco de dados e da interface do programa</a:t>
+                      </a:r>
+                    </a:p>
+                  </a:txBody>
+                  <a:tcPr marL="9525" marR="9525" marT="9525" marB="0" anchor="b">
+                    <a:lnL w="6350" cap="flat" cmpd="sng" algn="ctr">
+                      <a:solidFill>
+                        <a:srgbClr val="000000"/>
+                      </a:solidFill>
+                      <a:prstDash val="dot"/>
+                      <a:round/>
+                      <a:headEnd type="none" w="med" len="med"/>
+                      <a:tailEnd type="none" w="med" len="med"/>
+                    </a:lnL>
+                    <a:lnR w="6350" cap="flat" cmpd="sng" algn="ctr">
+                      <a:solidFill>
+                        <a:srgbClr val="000000"/>
+                      </a:solidFill>
+                      <a:prstDash val="dot"/>
+                      <a:round/>
+                      <a:headEnd type="none" w="med" len="med"/>
+                      <a:tailEnd type="none" w="med" len="med"/>
+                    </a:lnR>
+                    <a:lnT w="6350" cap="flat" cmpd="sng" algn="ctr">
+                      <a:solidFill>
+                        <a:srgbClr val="000000"/>
+                      </a:solidFill>
+                      <a:prstDash val="dot"/>
+                      <a:round/>
+                      <a:headEnd type="none" w="med" len="med"/>
+                      <a:tailEnd type="none" w="med" len="med"/>
+                    </a:lnT>
+                    <a:lnB w="6350" cap="flat" cmpd="sng" algn="ctr">
+                      <a:solidFill>
+                        <a:srgbClr val="000000"/>
+                      </a:solidFill>
+                      <a:prstDash val="dot"/>
+                      <a:round/>
+                      <a:headEnd type="none" w="med" len="med"/>
+                      <a:tailEnd type="none" w="med" len="med"/>
+                    </a:lnB>
+                  </a:tcPr>
+                </a:tc>
+                <a:tc>
+                  <a:txBody>
+                    <a:bodyPr/>
+                    <a:lstStyle/>
+                    <a:p>
+                      <a:pPr algn="l" fontAlgn="b"/>
+                      <a:r>
+                        <a:rPr lang="pt-BR" sz="2000" b="0" i="0" u="none" strike="noStrike" dirty="0">
+                          <a:effectLst/>
+                          <a:latin typeface="Arial"/>
+                        </a:rPr>
+                        <a:t> </a:t>
+                      </a:r>
+                    </a:p>
+                  </a:txBody>
+                  <a:tcPr marL="9525" marR="9525" marT="9525" marB="0" anchor="b">
+                    <a:lnL w="6350" cap="flat" cmpd="sng" algn="ctr">
+                      <a:solidFill>
+                        <a:srgbClr val="000000"/>
+                      </a:solidFill>
+                      <a:prstDash val="dot"/>
+                      <a:round/>
+                      <a:headEnd type="none" w="med" len="med"/>
+                      <a:tailEnd type="none" w="med" len="med"/>
+                    </a:lnL>
+                    <a:lnR w="6350" cap="flat" cmpd="sng" algn="ctr">
+                      <a:solidFill>
+                        <a:srgbClr val="000000"/>
+                      </a:solidFill>
+                      <a:prstDash val="dot"/>
+                      <a:round/>
+                      <a:headEnd type="none" w="med" len="med"/>
+                      <a:tailEnd type="none" w="med" len="med"/>
+                    </a:lnR>
+                    <a:lnT w="6350" cap="flat" cmpd="sng" algn="ctr">
+                      <a:solidFill>
+                        <a:srgbClr val="000000"/>
+                      </a:solidFill>
+                      <a:prstDash val="dot"/>
+                      <a:round/>
+                      <a:headEnd type="none" w="med" len="med"/>
+                      <a:tailEnd type="none" w="med" len="med"/>
+                    </a:lnT>
+                    <a:lnB w="6350" cap="flat" cmpd="sng" algn="ctr">
+                      <a:solidFill>
+                        <a:srgbClr val="000000"/>
+                      </a:solidFill>
+                      <a:prstDash val="dot"/>
+                      <a:round/>
+                      <a:headEnd type="none" w="med" len="med"/>
+                      <a:tailEnd type="none" w="med" len="med"/>
+                    </a:lnB>
+                  </a:tcPr>
+                </a:tc>
+              </a:tr>
+            </a:tbl>
+          </a:graphicData>
+        </a:graphic>
+      </p:graphicFrame>
+    </p:spTree>
+    <p:extLst>
+      <p:ext uri="{BB962C8B-B14F-4D97-AF65-F5344CB8AC3E}">
+        <p14:creationId xmlns:p14="http://schemas.microsoft.com/office/powerpoint/2010/main" val="1573777146"/>
       </p:ext>
     </p:extLst>
   </p:cSld>
@@ -7643,24 +7559,24 @@
           <p:nvPr>
             <p:extLst>
               <p:ext uri="{D42A27DB-BD31-4B8C-83A1-F6EECF244321}">
-                <p14:modId xmlns="" xmlns:p14="http://schemas.microsoft.com/office/powerpoint/2010/main" val="2730804079"/>
+                <p14:modId xmlns:p14="http://schemas.microsoft.com/office/powerpoint/2010/main" val="4053274123"/>
               </p:ext>
             </p:extLst>
           </p:nvPr>
         </p:nvGraphicFramePr>
         <p:xfrm>
-          <a:off x="107504" y="1268760"/>
-          <a:ext cx="8848774" cy="4289280"/>
+          <a:off x="251520" y="1196752"/>
+          <a:ext cx="8712968" cy="4588248"/>
         </p:xfrm>
         <a:graphic>
           <a:graphicData uri="http://schemas.openxmlformats.org/drawingml/2006/table">
             <a:tbl>
               <a:tblPr/>
               <a:tblGrid>
-                <a:gridCol w="5976664"/>
-                <a:gridCol w="2872110"/>
+                <a:gridCol w="6470534"/>
+                <a:gridCol w="2242434"/>
               </a:tblGrid>
-              <a:tr h="604260">
+              <a:tr h="477053">
                 <a:tc>
                   <a:txBody>
                     <a:bodyPr/>
@@ -7668,11 +7584,11 @@
                     <a:p>
                       <a:pPr algn="l" fontAlgn="b"/>
                       <a:r>
-                        <a:rPr lang="pt-BR" sz="2000" b="0" i="0" u="none" strike="noStrike" dirty="0">
+                        <a:rPr lang="pt-BR" sz="2800" b="0" i="0" u="none" strike="noStrike">
                           <a:effectLst/>
                           <a:latin typeface="Arial"/>
                         </a:rPr>
-                        <a:t>3ª semana</a:t>
+                        <a:t>4ª Semana</a:t>
                       </a:r>
                     </a:p>
                   </a:txBody>
@@ -7722,7 +7638,7 @@
                     <a:p>
                       <a:pPr algn="l" fontAlgn="b"/>
                       <a:r>
-                        <a:rPr lang="pt-BR" sz="2000" b="0" i="0" u="none" strike="noStrike">
+                        <a:rPr lang="pt-BR" sz="2800" b="0" i="0" u="none" strike="noStrike">
                           <a:effectLst/>
                           <a:latin typeface="Arial"/>
                         </a:rPr>
@@ -7770,7 +7686,7 @@
                   </a:tcPr>
                 </a:tc>
               </a:tr>
-              <a:tr h="604260">
+              <a:tr h="477053">
                 <a:tc>
                   <a:txBody>
                     <a:bodyPr/>
@@ -7778,23 +7694,12 @@
                     <a:p>
                       <a:pPr algn="l" fontAlgn="b"/>
                       <a:r>
-                        <a:rPr lang="pt-BR" sz="2000" b="0" i="0" u="none" strike="noStrike" dirty="0">
+                        <a:rPr lang="pt-BR" sz="2800" b="0" i="0" u="none" strike="noStrike">
                           <a:effectLst/>
                           <a:latin typeface="Arial"/>
                         </a:rPr>
-                        <a:t>Escolha do paradigma de desenvolvimento a ser </a:t>
+                        <a:t>Elaboração do banco de dados, dos módulos de cadastro</a:t>
                       </a:r>
-                      <a:r>
-                        <a:rPr lang="pt-BR" sz="2000" b="0" i="0" u="none" strike="noStrike" dirty="0" smtClean="0">
-                          <a:effectLst/>
-                          <a:latin typeface="Arial"/>
-                        </a:rPr>
-                        <a:t>utilizado</a:t>
-                      </a:r>
-                      <a:endParaRPr lang="pt-BR" sz="2000" b="0" i="0" u="none" strike="noStrike" dirty="0">
-                        <a:effectLst/>
-                        <a:latin typeface="Arial"/>
-                      </a:endParaRPr>
                     </a:p>
                   </a:txBody>
                   <a:tcPr marL="9525" marR="9525" marT="9525" marB="0" anchor="b">
@@ -7843,25 +7748,11 @@
                     <a:p>
                       <a:pPr algn="l" fontAlgn="b"/>
                       <a:r>
-                        <a:rPr lang="pt-BR" sz="2000" b="0" i="0" u="none" strike="noStrike" dirty="0" smtClean="0">
+                        <a:rPr lang="pt-BR" sz="2800" b="0" i="0" u="none" strike="noStrike">
                           <a:effectLst/>
                           <a:latin typeface="Arial"/>
                         </a:rPr>
-                        <a:t>Modelo </a:t>
-                      </a:r>
-                      <a:r>
-                        <a:rPr lang="pt-BR" sz="2000" b="0" i="0" u="none" strike="noStrike" dirty="0" err="1">
-                          <a:effectLst/>
-                          <a:latin typeface="Arial"/>
-                        </a:rPr>
-                        <a:t>logico</a:t>
-                      </a:r>
-                      <a:r>
-                        <a:rPr lang="pt-BR" sz="2000" b="0" i="0" u="none" strike="noStrike" dirty="0">
-                          <a:effectLst/>
-                          <a:latin typeface="Arial"/>
-                        </a:rPr>
-                        <a:t> do BD</a:t>
+                        <a:t>banco de dados</a:t>
                       </a:r>
                     </a:p>
                   </a:txBody>
@@ -7905,7 +7796,87 @@
                   </a:tcPr>
                 </a:tc>
               </a:tr>
-              <a:tr h="604260">
+              <a:tr h="477053">
+                <a:tc>
+                  <a:txBody>
+                    <a:bodyPr/>
+                    <a:lstStyle/>
+                    <a:p>
+                      <a:pPr algn="l" fontAlgn="b"/>
+                      <a:endParaRPr lang="pt-BR" sz="2800" b="0" i="0" u="none" strike="noStrike">
+                        <a:effectLst/>
+                        <a:latin typeface="Arial"/>
+                      </a:endParaRPr>
+                    </a:p>
+                  </a:txBody>
+                  <a:tcPr marL="9525" marR="9525" marT="9525" marB="0" anchor="b">
+                    <a:lnL>
+                      <a:noFill/>
+                    </a:lnL>
+                    <a:lnR>
+                      <a:noFill/>
+                    </a:lnR>
+                    <a:lnT w="6350" cap="flat" cmpd="sng" algn="ctr">
+                      <a:solidFill>
+                        <a:srgbClr val="000000"/>
+                      </a:solidFill>
+                      <a:prstDash val="dot"/>
+                      <a:round/>
+                      <a:headEnd type="none" w="med" len="med"/>
+                      <a:tailEnd type="none" w="med" len="med"/>
+                    </a:lnT>
+                    <a:lnB w="6350" cap="flat" cmpd="sng" algn="ctr">
+                      <a:solidFill>
+                        <a:srgbClr val="000000"/>
+                      </a:solidFill>
+                      <a:prstDash val="dot"/>
+                      <a:round/>
+                      <a:headEnd type="none" w="med" len="med"/>
+                      <a:tailEnd type="none" w="med" len="med"/>
+                    </a:lnB>
+                  </a:tcPr>
+                </a:tc>
+                <a:tc>
+                  <a:txBody>
+                    <a:bodyPr/>
+                    <a:lstStyle/>
+                    <a:p>
+                      <a:pPr algn="l" fontAlgn="b"/>
+                      <a:endParaRPr lang="pt-BR" sz="2800" b="0" i="0" u="none" strike="noStrike">
+                        <a:effectLst/>
+                        <a:latin typeface="Arial"/>
+                      </a:endParaRPr>
+                    </a:p>
+                  </a:txBody>
+                  <a:tcPr marL="9525" marR="9525" marT="9525" marB="0" anchor="b">
+                    <a:lnL>
+                      <a:noFill/>
+                    </a:lnL>
+                    <a:lnR>
+                      <a:noFill/>
+                    </a:lnR>
+                    <a:lnT w="6350" cap="flat" cmpd="sng" algn="ctr">
+                      <a:solidFill>
+                        <a:srgbClr val="000000"/>
+                      </a:solidFill>
+                      <a:prstDash val="dot"/>
+                      <a:round/>
+                      <a:headEnd type="none" w="med" len="med"/>
+                      <a:tailEnd type="none" w="med" len="med"/>
+                    </a:lnT>
+                    <a:lnB w="6350" cap="flat" cmpd="sng" algn="ctr">
+                      <a:solidFill>
+                        <a:srgbClr val="000000"/>
+                      </a:solidFill>
+                      <a:prstDash val="dot"/>
+                      <a:round/>
+                      <a:headEnd type="none" w="med" len="med"/>
+                      <a:tailEnd type="none" w="med" len="med"/>
+                    </a:lnB>
+                  </a:tcPr>
+                </a:tc>
+              </a:tr>
+              <a:tr h="477053">
                 <a:tc>
                   <a:txBody>
                     <a:bodyPr/>
@@ -7913,11 +7884,11 @@
                     <a:p>
                       <a:pPr algn="l" fontAlgn="b"/>
                       <a:r>
-                        <a:rPr lang="pt-BR" sz="2000" b="0" i="0" u="none" strike="noStrike">
+                        <a:rPr lang="pt-BR" sz="2800" b="0" i="0" u="none" strike="noStrike">
                           <a:effectLst/>
                           <a:latin typeface="Arial"/>
                         </a:rPr>
-                        <a:t>Escolha da linguagem utilizada</a:t>
+                        <a:t>5ª semana</a:t>
                       </a:r>
                     </a:p>
                   </a:txBody>
@@ -7967,11 +7938,11 @@
                     <a:p>
                       <a:pPr algn="l" fontAlgn="b"/>
                       <a:r>
-                        <a:rPr lang="pt-BR" sz="2000" b="0" i="0" u="none" strike="noStrike">
+                        <a:rPr lang="pt-BR" sz="2800" b="0" i="0" u="none" strike="noStrike">
                           <a:effectLst/>
                           <a:latin typeface="Arial"/>
                         </a:rPr>
-                        <a:t>Prévia da interface</a:t>
+                        <a:t>Gerou</a:t>
                       </a:r>
                     </a:p>
                   </a:txBody>
@@ -8015,7 +7986,7 @@
                   </a:tcPr>
                 </a:tc>
               </a:tr>
-              <a:tr h="604260">
+              <a:tr h="477053">
                 <a:tc>
                   <a:txBody>
                     <a:bodyPr/>
@@ -8023,11 +7994,11 @@
                     <a:p>
                       <a:pPr algn="l" fontAlgn="b"/>
                       <a:r>
-                        <a:rPr lang="pt-BR" sz="2000" b="0" i="0" u="none" strike="noStrike">
+                        <a:rPr lang="pt-BR" sz="2800" b="0" i="0" u="none" strike="noStrike">
                           <a:effectLst/>
                           <a:latin typeface="Arial"/>
                         </a:rPr>
-                        <a:t>Escolha das IDEs e sistemas operacionais, computadores</a:t>
+                        <a:t>Elaboração da interface gráfica e testes.</a:t>
                       </a:r>
                     </a:p>
                   </a:txBody>
@@ -8077,11 +8048,11 @@
                     <a:p>
                       <a:pPr algn="l" fontAlgn="b"/>
                       <a:r>
-                        <a:rPr lang="pt-BR" sz="2000" b="0" i="0" u="none" strike="noStrike">
+                        <a:rPr lang="pt-BR" sz="2800" b="0" i="0" u="none" strike="noStrike">
                           <a:effectLst/>
                           <a:latin typeface="Arial"/>
                         </a:rPr>
-                        <a:t> </a:t>
+                        <a:t>Interface</a:t>
                       </a:r>
                     </a:p>
                   </a:txBody>
@@ -8125,7 +8096,87 @@
                   </a:tcPr>
                 </a:tc>
               </a:tr>
-              <a:tr h="604260">
+              <a:tr h="477053">
+                <a:tc>
+                  <a:txBody>
+                    <a:bodyPr/>
+                    <a:lstStyle/>
+                    <a:p>
+                      <a:pPr algn="l" fontAlgn="b"/>
+                      <a:endParaRPr lang="pt-BR" sz="2800" b="0" i="0" u="none" strike="noStrike">
+                        <a:effectLst/>
+                        <a:latin typeface="Arial"/>
+                      </a:endParaRPr>
+                    </a:p>
+                  </a:txBody>
+                  <a:tcPr marL="9525" marR="9525" marT="9525" marB="0" anchor="b">
+                    <a:lnL>
+                      <a:noFill/>
+                    </a:lnL>
+                    <a:lnR>
+                      <a:noFill/>
+                    </a:lnR>
+                    <a:lnT w="6350" cap="flat" cmpd="sng" algn="ctr">
+                      <a:solidFill>
+                        <a:srgbClr val="000000"/>
+                      </a:solidFill>
+                      <a:prstDash val="dot"/>
+                      <a:round/>
+                      <a:headEnd type="none" w="med" len="med"/>
+                      <a:tailEnd type="none" w="med" len="med"/>
+                    </a:lnT>
+                    <a:lnB w="6350" cap="flat" cmpd="sng" algn="ctr">
+                      <a:solidFill>
+                        <a:srgbClr val="000000"/>
+                      </a:solidFill>
+                      <a:prstDash val="dot"/>
+                      <a:round/>
+                      <a:headEnd type="none" w="med" len="med"/>
+                      <a:tailEnd type="none" w="med" len="med"/>
+                    </a:lnB>
+                  </a:tcPr>
+                </a:tc>
+                <a:tc>
+                  <a:txBody>
+                    <a:bodyPr/>
+                    <a:lstStyle/>
+                    <a:p>
+                      <a:pPr algn="l" fontAlgn="b"/>
+                      <a:endParaRPr lang="pt-BR" sz="2800" b="0" i="0" u="none" strike="noStrike">
+                        <a:effectLst/>
+                        <a:latin typeface="Arial"/>
+                      </a:endParaRPr>
+                    </a:p>
+                  </a:txBody>
+                  <a:tcPr marL="9525" marR="9525" marT="9525" marB="0" anchor="b">
+                    <a:lnL>
+                      <a:noFill/>
+                    </a:lnL>
+                    <a:lnR>
+                      <a:noFill/>
+                    </a:lnR>
+                    <a:lnT w="6350" cap="flat" cmpd="sng" algn="ctr">
+                      <a:solidFill>
+                        <a:srgbClr val="000000"/>
+                      </a:solidFill>
+                      <a:prstDash val="dot"/>
+                      <a:round/>
+                      <a:headEnd type="none" w="med" len="med"/>
+                      <a:tailEnd type="none" w="med" len="med"/>
+                    </a:lnT>
+                    <a:lnB w="6350" cap="flat" cmpd="sng" algn="ctr">
+                      <a:solidFill>
+                        <a:srgbClr val="000000"/>
+                      </a:solidFill>
+                      <a:prstDash val="dot"/>
+                      <a:round/>
+                      <a:headEnd type="none" w="med" len="med"/>
+                      <a:tailEnd type="none" w="med" len="med"/>
+                    </a:lnB>
+                  </a:tcPr>
+                </a:tc>
+              </a:tr>
+              <a:tr h="477053">
                 <a:tc>
                   <a:txBody>
                     <a:bodyPr/>
@@ -8133,11 +8184,11 @@
                     <a:p>
                       <a:pPr algn="l" fontAlgn="b"/>
                       <a:r>
-                        <a:rPr lang="pt-BR" sz="2000" b="0" i="0" u="none" strike="noStrike">
+                        <a:rPr lang="pt-BR" sz="2800" b="0" i="0" u="none" strike="noStrike">
                           <a:effectLst/>
                           <a:latin typeface="Arial"/>
                         </a:rPr>
-                        <a:t>Definição de qual parte cada integrante ficara responsavel</a:t>
+                        <a:t>6ª Semana</a:t>
                       </a:r>
                     </a:p>
                   </a:txBody>
@@ -8187,11 +8238,11 @@
                     <a:p>
                       <a:pPr algn="l" fontAlgn="b"/>
                       <a:r>
-                        <a:rPr lang="pt-BR" sz="2000" b="0" i="0" u="none" strike="noStrike">
+                        <a:rPr lang="pt-BR" sz="2800" b="0" i="0" u="none" strike="noStrike">
                           <a:effectLst/>
                           <a:latin typeface="Arial"/>
                         </a:rPr>
-                        <a:t> </a:t>
+                        <a:t>Gerou</a:t>
                       </a:r>
                     </a:p>
                   </a:txBody>
@@ -8235,7 +8286,7 @@
                   </a:tcPr>
                 </a:tc>
               </a:tr>
-              <a:tr h="604260">
+              <a:tr h="477053">
                 <a:tc>
                   <a:txBody>
                     <a:bodyPr/>
@@ -8243,11 +8294,11 @@
                     <a:p>
                       <a:pPr algn="l" fontAlgn="b"/>
                       <a:r>
-                        <a:rPr lang="pt-BR" sz="2000" b="0" i="0" u="none" strike="noStrike">
+                        <a:rPr lang="pt-BR" sz="2800" b="0" i="0" u="none" strike="noStrike">
                           <a:effectLst/>
                           <a:latin typeface="Arial"/>
                         </a:rPr>
-                        <a:t>Definição dos hardwares que serão utilizados</a:t>
+                        <a:t>Manutenção corretiva e testes finais</a:t>
                       </a:r>
                     </a:p>
                   </a:txBody>
@@ -8297,121 +8348,11 @@
                     <a:p>
                       <a:pPr algn="l" fontAlgn="b"/>
                       <a:r>
-                        <a:rPr lang="pt-BR" sz="2000" b="0" i="0" u="none" strike="noStrike">
+                        <a:rPr lang="pt-BR" sz="2800" b="0" i="0" u="none" strike="noStrike" dirty="0">
                           <a:effectLst/>
                           <a:latin typeface="Arial"/>
                         </a:rPr>
-                        <a:t> </a:t>
-                      </a:r>
-                    </a:p>
-                  </a:txBody>
-                  <a:tcPr marL="9525" marR="9525" marT="9525" marB="0" anchor="b">
-                    <a:lnL w="6350" cap="flat" cmpd="sng" algn="ctr">
-                      <a:solidFill>
-                        <a:srgbClr val="000000"/>
-                      </a:solidFill>
-                      <a:prstDash val="dot"/>
-                      <a:round/>
-                      <a:headEnd type="none" w="med" len="med"/>
-                      <a:tailEnd type="none" w="med" len="med"/>
-                    </a:lnL>
-                    <a:lnR w="6350" cap="flat" cmpd="sng" algn="ctr">
-                      <a:solidFill>
-                        <a:srgbClr val="000000"/>
-                      </a:solidFill>
-                      <a:prstDash val="dot"/>
-                      <a:round/>
-                      <a:headEnd type="none" w="med" len="med"/>
-                      <a:tailEnd type="none" w="med" len="med"/>
-                    </a:lnR>
-                    <a:lnT w="6350" cap="flat" cmpd="sng" algn="ctr">
-                      <a:solidFill>
-                        <a:srgbClr val="000000"/>
-                      </a:solidFill>
-                      <a:prstDash val="dot"/>
-                      <a:round/>
-                      <a:headEnd type="none" w="med" len="med"/>
-                      <a:tailEnd type="none" w="med" len="med"/>
-                    </a:lnT>
-                    <a:lnB w="6350" cap="flat" cmpd="sng" algn="ctr">
-                      <a:solidFill>
-                        <a:srgbClr val="000000"/>
-                      </a:solidFill>
-                      <a:prstDash val="dot"/>
-                      <a:round/>
-                      <a:headEnd type="none" w="med" len="med"/>
-                      <a:tailEnd type="none" w="med" len="med"/>
-                    </a:lnB>
-                  </a:tcPr>
-                </a:tc>
-              </a:tr>
-              <a:tr h="604260">
-                <a:tc>
-                  <a:txBody>
-                    <a:bodyPr/>
-                    <a:lstStyle/>
-                    <a:p>
-                      <a:pPr algn="l" fontAlgn="b"/>
-                      <a:r>
-                        <a:rPr lang="pt-BR" sz="2000" b="0" i="0" u="none" strike="noStrike">
-                          <a:effectLst/>
-                          <a:latin typeface="Arial"/>
-                        </a:rPr>
-                        <a:t>Esboço do modelo lógico do banco de dados e da interface do programa</a:t>
-                      </a:r>
-                    </a:p>
-                  </a:txBody>
-                  <a:tcPr marL="9525" marR="9525" marT="9525" marB="0" anchor="b">
-                    <a:lnL w="6350" cap="flat" cmpd="sng" algn="ctr">
-                      <a:solidFill>
-                        <a:srgbClr val="000000"/>
-                      </a:solidFill>
-                      <a:prstDash val="dot"/>
-                      <a:round/>
-                      <a:headEnd type="none" w="med" len="med"/>
-                      <a:tailEnd type="none" w="med" len="med"/>
-                    </a:lnL>
-                    <a:lnR w="6350" cap="flat" cmpd="sng" algn="ctr">
-                      <a:solidFill>
-                        <a:srgbClr val="000000"/>
-                      </a:solidFill>
-                      <a:prstDash val="dot"/>
-                      <a:round/>
-                      <a:headEnd type="none" w="med" len="med"/>
-                      <a:tailEnd type="none" w="med" len="med"/>
-                    </a:lnR>
-                    <a:lnT w="6350" cap="flat" cmpd="sng" algn="ctr">
-                      <a:solidFill>
-                        <a:srgbClr val="000000"/>
-                      </a:solidFill>
-                      <a:prstDash val="dot"/>
-                      <a:round/>
-                      <a:headEnd type="none" w="med" len="med"/>
-                      <a:tailEnd type="none" w="med" len="med"/>
-                    </a:lnT>
-                    <a:lnB w="6350" cap="flat" cmpd="sng" algn="ctr">
-                      <a:solidFill>
-                        <a:srgbClr val="000000"/>
-                      </a:solidFill>
-                      <a:prstDash val="dot"/>
-                      <a:round/>
-                      <a:headEnd type="none" w="med" len="med"/>
-                      <a:tailEnd type="none" w="med" len="med"/>
-                    </a:lnB>
-                  </a:tcPr>
-                </a:tc>
-                <a:tc>
-                  <a:txBody>
-                    <a:bodyPr/>
-                    <a:lstStyle/>
-                    <a:p>
-                      <a:pPr algn="l" fontAlgn="b"/>
-                      <a:r>
-                        <a:rPr lang="pt-BR" sz="2000" b="0" i="0" u="none" strike="noStrike" dirty="0">
-                          <a:effectLst/>
-                          <a:latin typeface="Arial"/>
-                        </a:rPr>
-                        <a:t> </a:t>
+                        <a:t>Programa Final</a:t>
                       </a:r>
                     </a:p>
                   </a:txBody>
@@ -8462,7 +8403,7 @@
     </p:spTree>
     <p:extLst>
       <p:ext uri="{BB962C8B-B14F-4D97-AF65-F5344CB8AC3E}">
-        <p14:creationId xmlns="" xmlns:p14="http://schemas.microsoft.com/office/powerpoint/2010/main" val="1573777146"/>
+        <p14:creationId xmlns:p14="http://schemas.microsoft.com/office/powerpoint/2010/main" val="2646964981"/>
       </p:ext>
     </p:extLst>
   </p:cSld>

</xml_diff>